<commit_message>
Tested on Glade, Added More Tests, Better Documentation, Some Code Refactoring
</commit_message>
<xml_diff>
--- a/Presentation _of_work_done.pptx
+++ b/Presentation _of_work_done.pptx
@@ -29,6 +29,14 @@
     <p:sldId id="274" r:id="rId24"/>
     <p:sldId id="275" r:id="rId25"/>
     <p:sldId id="276" r:id="rId26"/>
+    <p:sldId id="277" r:id="rId27"/>
+    <p:sldId id="278" r:id="rId28"/>
+    <p:sldId id="279" r:id="rId29"/>
+    <p:sldId id="280" r:id="rId30"/>
+    <p:sldId id="281" r:id="rId31"/>
+    <p:sldId id="282" r:id="rId32"/>
+    <p:sldId id="283" r:id="rId33"/>
+    <p:sldId id="284" r:id="rId34"/>
   </p:sldIdLst>
   <p:sldSz cy="5143500" cx="9144000"/>
   <p:notesSz cx="6858000" cy="9144000"/>
@@ -1218,7 +1226,7 @@
       </p:grpSpPr>
       <p:sp>
         <p:nvSpPr>
-          <p:cNvPr id="129" name="Google Shape;129;g5699ac68fd_0_167:notes"/>
+          <p:cNvPr id="129" name="Google Shape;129;g58b7299f48_0_48:notes"/>
           <p:cNvSpPr/>
           <p:nvPr>
             <p:ph idx="2" type="sldImg"/>
@@ -1253,7 +1261,7 @@
       </p:sp>
       <p:sp>
         <p:nvSpPr>
-          <p:cNvPr id="130" name="Google Shape;130;g5699ac68fd_0_167:notes"/>
+          <p:cNvPr id="130" name="Google Shape;130;g58b7299f48_0_48:notes"/>
           <p:cNvSpPr txBox="1"/>
           <p:nvPr>
             <p:ph idx="1" type="body"/>
@@ -1317,7 +1325,7 @@
       </p:grpSpPr>
       <p:sp>
         <p:nvSpPr>
-          <p:cNvPr id="135" name="Google Shape;135;g5699ac68fd_0_172:notes"/>
+          <p:cNvPr id="135" name="Google Shape;135;g5699ac68fd_0_167:notes"/>
           <p:cNvSpPr/>
           <p:nvPr>
             <p:ph idx="2" type="sldImg"/>
@@ -1352,7 +1360,7 @@
       </p:sp>
       <p:sp>
         <p:nvSpPr>
-          <p:cNvPr id="136" name="Google Shape;136;g5699ac68fd_0_172:notes"/>
+          <p:cNvPr id="136" name="Google Shape;136;g5699ac68fd_0_167:notes"/>
           <p:cNvSpPr txBox="1"/>
           <p:nvPr>
             <p:ph idx="1" type="body"/>
@@ -1402,7 +1410,7 @@
   <p:cSld>
     <p:spTree>
       <p:nvGrpSpPr>
-        <p:cNvPr id="141" name="Shape 141"/>
+        <p:cNvPr id="140" name="Shape 140"/>
         <p:cNvGrpSpPr/>
         <p:nvPr/>
       </p:nvGrpSpPr>
@@ -1416,7 +1424,7 @@
       </p:grpSpPr>
       <p:sp>
         <p:nvSpPr>
-          <p:cNvPr id="142" name="Google Shape;142;g5699ac68fd_0_177:notes"/>
+          <p:cNvPr id="141" name="Google Shape;141;g5699ac68fd_0_172:notes"/>
           <p:cNvSpPr/>
           <p:nvPr>
             <p:ph idx="2" type="sldImg"/>
@@ -1451,7 +1459,7 @@
       </p:sp>
       <p:sp>
         <p:nvSpPr>
-          <p:cNvPr id="143" name="Google Shape;143;g5699ac68fd_0_177:notes"/>
+          <p:cNvPr id="142" name="Google Shape;142;g5699ac68fd_0_172:notes"/>
           <p:cNvSpPr txBox="1"/>
           <p:nvPr>
             <p:ph idx="1" type="body"/>
@@ -1501,7 +1509,7 @@
   <p:cSld>
     <p:spTree>
       <p:nvGrpSpPr>
-        <p:cNvPr id="148" name="Shape 148"/>
+        <p:cNvPr id="147" name="Shape 147"/>
         <p:cNvGrpSpPr/>
         <p:nvPr/>
       </p:nvGrpSpPr>
@@ -1515,7 +1523,7 @@
       </p:grpSpPr>
       <p:sp>
         <p:nvSpPr>
-          <p:cNvPr id="149" name="Google Shape;149;g5699ac68fd_0_182:notes"/>
+          <p:cNvPr id="148" name="Google Shape;148;g58b7299f48_0_0:notes"/>
           <p:cNvSpPr/>
           <p:nvPr>
             <p:ph idx="2" type="sldImg"/>
@@ -1550,7 +1558,7 @@
       </p:sp>
       <p:sp>
         <p:nvSpPr>
-          <p:cNvPr id="150" name="Google Shape;150;g5699ac68fd_0_182:notes"/>
+          <p:cNvPr id="149" name="Google Shape;149;g58b7299f48_0_0:notes"/>
           <p:cNvSpPr txBox="1"/>
           <p:nvPr>
             <p:ph idx="1" type="body"/>
@@ -1600,7 +1608,7 @@
   <p:cSld>
     <p:spTree>
       <p:nvGrpSpPr>
-        <p:cNvPr id="155" name="Shape 155"/>
+        <p:cNvPr id="154" name="Shape 154"/>
         <p:cNvGrpSpPr/>
         <p:nvPr/>
       </p:nvGrpSpPr>
@@ -1614,7 +1622,7 @@
       </p:grpSpPr>
       <p:sp>
         <p:nvSpPr>
-          <p:cNvPr id="156" name="Google Shape;156;g5699ac68fd_0_187:notes"/>
+          <p:cNvPr id="155" name="Google Shape;155;g5699ac68fd_0_177:notes"/>
           <p:cNvSpPr/>
           <p:nvPr>
             <p:ph idx="2" type="sldImg"/>
@@ -1649,7 +1657,7 @@
       </p:sp>
       <p:sp>
         <p:nvSpPr>
-          <p:cNvPr id="157" name="Google Shape;157;g5699ac68fd_0_187:notes"/>
+          <p:cNvPr id="156" name="Google Shape;156;g5699ac68fd_0_177:notes"/>
           <p:cNvSpPr txBox="1"/>
           <p:nvPr>
             <p:ph idx="1" type="body"/>
@@ -1699,7 +1707,7 @@
   <p:cSld>
     <p:spTree>
       <p:nvGrpSpPr>
-        <p:cNvPr id="162" name="Shape 162"/>
+        <p:cNvPr id="161" name="Shape 161"/>
         <p:cNvGrpSpPr/>
         <p:nvPr/>
       </p:nvGrpSpPr>
@@ -1713,7 +1721,7 @@
       </p:grpSpPr>
       <p:sp>
         <p:nvSpPr>
-          <p:cNvPr id="163" name="Google Shape;163;g5699ac68fd_0_192:notes"/>
+          <p:cNvPr id="162" name="Google Shape;162;g5699ac68fd_0_182:notes"/>
           <p:cNvSpPr/>
           <p:nvPr>
             <p:ph idx="2" type="sldImg"/>
@@ -1748,7 +1756,7 @@
       </p:sp>
       <p:sp>
         <p:nvSpPr>
-          <p:cNvPr id="164" name="Google Shape;164;g5699ac68fd_0_192:notes"/>
+          <p:cNvPr id="163" name="Google Shape;163;g5699ac68fd_0_182:notes"/>
           <p:cNvSpPr txBox="1"/>
           <p:nvPr>
             <p:ph idx="1" type="body"/>
@@ -1897,7 +1905,7 @@
   <p:cSld>
     <p:spTree>
       <p:nvGrpSpPr>
-        <p:cNvPr id="169" name="Shape 169"/>
+        <p:cNvPr id="168" name="Shape 168"/>
         <p:cNvGrpSpPr/>
         <p:nvPr/>
       </p:nvGrpSpPr>
@@ -1911,7 +1919,7 @@
       </p:grpSpPr>
       <p:sp>
         <p:nvSpPr>
-          <p:cNvPr id="170" name="Google Shape;170;g5699ac68fd_0_197:notes"/>
+          <p:cNvPr id="169" name="Google Shape;169;g5699ac68fd_0_187:notes"/>
           <p:cNvSpPr/>
           <p:nvPr>
             <p:ph idx="2" type="sldImg"/>
@@ -1946,7 +1954,7 @@
       </p:sp>
       <p:sp>
         <p:nvSpPr>
-          <p:cNvPr id="171" name="Google Shape;171;g5699ac68fd_0_197:notes"/>
+          <p:cNvPr id="170" name="Google Shape;170;g5699ac68fd_0_187:notes"/>
           <p:cNvSpPr txBox="1"/>
           <p:nvPr>
             <p:ph idx="1" type="body"/>
@@ -1996,7 +2004,7 @@
   <p:cSld>
     <p:spTree>
       <p:nvGrpSpPr>
-        <p:cNvPr id="176" name="Shape 176"/>
+        <p:cNvPr id="175" name="Shape 175"/>
         <p:cNvGrpSpPr/>
         <p:nvPr/>
       </p:nvGrpSpPr>
@@ -2010,7 +2018,7 @@
       </p:grpSpPr>
       <p:sp>
         <p:nvSpPr>
-          <p:cNvPr id="177" name="Google Shape;177;g5699ac68fd_0_202:notes"/>
+          <p:cNvPr id="176" name="Google Shape;176;g5699ac68fd_0_192:notes"/>
           <p:cNvSpPr/>
           <p:nvPr>
             <p:ph idx="2" type="sldImg"/>
@@ -2045,7 +2053,799 @@
       </p:sp>
       <p:sp>
         <p:nvSpPr>
-          <p:cNvPr id="178" name="Google Shape;178;g5699ac68fd_0_202:notes"/>
+          <p:cNvPr id="177" name="Google Shape;177;g5699ac68fd_0_192:notes"/>
+          <p:cNvSpPr txBox="1"/>
+          <p:nvPr>
+            <p:ph idx="1" type="body"/>
+          </p:nvPr>
+        </p:nvSpPr>
+        <p:spPr>
+          <a:xfrm>
+            <a:off x="685800" y="4343400"/>
+            <a:ext cx="5486400" cy="4114800"/>
+          </a:xfrm>
+          <a:prstGeom prst="rect">
+            <a:avLst/>
+          </a:prstGeom>
+        </p:spPr>
+        <p:txBody>
+          <a:bodyPr anchorCtr="0" anchor="t" bIns="91425" lIns="91425" spcFirstLastPara="1" rIns="91425" wrap="square" tIns="91425">
+            <a:noAutofit/>
+          </a:bodyPr>
+          <a:lstStyle/>
+          <a:p>
+            <a:pPr indent="0" lvl="0" marL="0" rtl="0" algn="l">
+              <a:spcBef>
+                <a:spcPts val="0"/>
+              </a:spcBef>
+              <a:spcAft>
+                <a:spcPts val="0"/>
+              </a:spcAft>
+              <a:buNone/>
+            </a:pPr>
+            <a:r>
+              <a:t/>
+            </a:r>
+            <a:endParaRPr/>
+          </a:p>
+        </p:txBody>
+      </p:sp>
+    </p:spTree>
+  </p:cSld>
+  <p:clrMapOvr>
+    <a:masterClrMapping/>
+  </p:clrMapOvr>
+</p:notes>
+</file>
+
+<file path=ppt/notesSlides/notesSlide22.xml><?xml version="1.0" encoding="utf-8"?>
+<p:notes xmlns:a="http://schemas.openxmlformats.org/drawingml/2006/main" xmlns:r="http://schemas.openxmlformats.org/officeDocument/2006/relationships" xmlns:mc="http://schemas.openxmlformats.org/markup-compatibility/2006" xmlns:mv="urn:schemas-microsoft-com:mac:vml" xmlns:p="http://schemas.openxmlformats.org/presentationml/2006/main" xmlns:c="http://schemas.openxmlformats.org/drawingml/2006/chart" xmlns:dgm="http://schemas.openxmlformats.org/drawingml/2006/diagram" xmlns:o="urn:schemas-microsoft-com:office:office" xmlns:v="urn:schemas-microsoft-com:vml" xmlns:pvml="urn:schemas-microsoft-com:office:powerpoint" xmlns:com="http://schemas.openxmlformats.org/drawingml/2006/compatibility" xmlns:p14="http://schemas.microsoft.com/office/powerpoint/2010/main" xmlns:p15="http://schemas.microsoft.com/office/powerpoint/2012/main" showMasterPhAnim="0" showMasterSp="0">
+  <p:cSld>
+    <p:spTree>
+      <p:nvGrpSpPr>
+        <p:cNvPr id="182" name="Shape 182"/>
+        <p:cNvGrpSpPr/>
+        <p:nvPr/>
+      </p:nvGrpSpPr>
+      <p:grpSpPr>
+        <a:xfrm>
+          <a:off x="0" y="0"/>
+          <a:ext cx="0" cy="0"/>
+          <a:chOff x="0" y="0"/>
+          <a:chExt cx="0" cy="0"/>
+        </a:xfrm>
+      </p:grpSpPr>
+      <p:sp>
+        <p:nvSpPr>
+          <p:cNvPr id="183" name="Google Shape;183;g5699ac68fd_0_197:notes"/>
+          <p:cNvSpPr/>
+          <p:nvPr>
+            <p:ph idx="2" type="sldImg"/>
+          </p:nvPr>
+        </p:nvSpPr>
+        <p:spPr>
+          <a:xfrm>
+            <a:off x="381300" y="685800"/>
+            <a:ext cx="6096000" cy="3429000"/>
+          </a:xfrm>
+          <a:custGeom>
+            <a:rect b="b" l="l" r="r" t="t"/>
+            <a:pathLst>
+              <a:path extrusionOk="0" h="120000" w="120000">
+                <a:moveTo>
+                  <a:pt x="0" y="0"/>
+                </a:moveTo>
+                <a:lnTo>
+                  <a:pt x="120000" y="0"/>
+                </a:lnTo>
+                <a:lnTo>
+                  <a:pt x="120000" y="120000"/>
+                </a:lnTo>
+                <a:lnTo>
+                  <a:pt x="0" y="120000"/>
+                </a:lnTo>
+                <a:close/>
+              </a:path>
+            </a:pathLst>
+          </a:custGeom>
+        </p:spPr>
+      </p:sp>
+      <p:sp>
+        <p:nvSpPr>
+          <p:cNvPr id="184" name="Google Shape;184;g5699ac68fd_0_197:notes"/>
+          <p:cNvSpPr txBox="1"/>
+          <p:nvPr>
+            <p:ph idx="1" type="body"/>
+          </p:nvPr>
+        </p:nvSpPr>
+        <p:spPr>
+          <a:xfrm>
+            <a:off x="685800" y="4343400"/>
+            <a:ext cx="5486400" cy="4114800"/>
+          </a:xfrm>
+          <a:prstGeom prst="rect">
+            <a:avLst/>
+          </a:prstGeom>
+        </p:spPr>
+        <p:txBody>
+          <a:bodyPr anchorCtr="0" anchor="t" bIns="91425" lIns="91425" spcFirstLastPara="1" rIns="91425" wrap="square" tIns="91425">
+            <a:noAutofit/>
+          </a:bodyPr>
+          <a:lstStyle/>
+          <a:p>
+            <a:pPr indent="0" lvl="0" marL="0" rtl="0" algn="l">
+              <a:spcBef>
+                <a:spcPts val="0"/>
+              </a:spcBef>
+              <a:spcAft>
+                <a:spcPts val="0"/>
+              </a:spcAft>
+              <a:buNone/>
+            </a:pPr>
+            <a:r>
+              <a:t/>
+            </a:r>
+            <a:endParaRPr/>
+          </a:p>
+        </p:txBody>
+      </p:sp>
+    </p:spTree>
+  </p:cSld>
+  <p:clrMapOvr>
+    <a:masterClrMapping/>
+  </p:clrMapOvr>
+</p:notes>
+</file>
+
+<file path=ppt/notesSlides/notesSlide23.xml><?xml version="1.0" encoding="utf-8"?>
+<p:notes xmlns:a="http://schemas.openxmlformats.org/drawingml/2006/main" xmlns:r="http://schemas.openxmlformats.org/officeDocument/2006/relationships" xmlns:mc="http://schemas.openxmlformats.org/markup-compatibility/2006" xmlns:mv="urn:schemas-microsoft-com:mac:vml" xmlns:p="http://schemas.openxmlformats.org/presentationml/2006/main" xmlns:c="http://schemas.openxmlformats.org/drawingml/2006/chart" xmlns:dgm="http://schemas.openxmlformats.org/drawingml/2006/diagram" xmlns:o="urn:schemas-microsoft-com:office:office" xmlns:v="urn:schemas-microsoft-com:vml" xmlns:pvml="urn:schemas-microsoft-com:office:powerpoint" xmlns:com="http://schemas.openxmlformats.org/drawingml/2006/compatibility" xmlns:p14="http://schemas.microsoft.com/office/powerpoint/2010/main" xmlns:p15="http://schemas.microsoft.com/office/powerpoint/2012/main" showMasterPhAnim="0" showMasterSp="0">
+  <p:cSld>
+    <p:spTree>
+      <p:nvGrpSpPr>
+        <p:cNvPr id="189" name="Shape 189"/>
+        <p:cNvGrpSpPr/>
+        <p:nvPr/>
+      </p:nvGrpSpPr>
+      <p:grpSpPr>
+        <a:xfrm>
+          <a:off x="0" y="0"/>
+          <a:ext cx="0" cy="0"/>
+          <a:chOff x="0" y="0"/>
+          <a:chExt cx="0" cy="0"/>
+        </a:xfrm>
+      </p:grpSpPr>
+      <p:sp>
+        <p:nvSpPr>
+          <p:cNvPr id="190" name="Google Shape;190;g58b7299f48_0_12:notes"/>
+          <p:cNvSpPr/>
+          <p:nvPr>
+            <p:ph idx="2" type="sldImg"/>
+          </p:nvPr>
+        </p:nvSpPr>
+        <p:spPr>
+          <a:xfrm>
+            <a:off x="381300" y="685800"/>
+            <a:ext cx="6096000" cy="3429000"/>
+          </a:xfrm>
+          <a:custGeom>
+            <a:rect b="b" l="l" r="r" t="t"/>
+            <a:pathLst>
+              <a:path extrusionOk="0" h="120000" w="120000">
+                <a:moveTo>
+                  <a:pt x="0" y="0"/>
+                </a:moveTo>
+                <a:lnTo>
+                  <a:pt x="120000" y="0"/>
+                </a:lnTo>
+                <a:lnTo>
+                  <a:pt x="120000" y="120000"/>
+                </a:lnTo>
+                <a:lnTo>
+                  <a:pt x="0" y="120000"/>
+                </a:lnTo>
+                <a:close/>
+              </a:path>
+            </a:pathLst>
+          </a:custGeom>
+        </p:spPr>
+      </p:sp>
+      <p:sp>
+        <p:nvSpPr>
+          <p:cNvPr id="191" name="Google Shape;191;g58b7299f48_0_12:notes"/>
+          <p:cNvSpPr txBox="1"/>
+          <p:nvPr>
+            <p:ph idx="1" type="body"/>
+          </p:nvPr>
+        </p:nvSpPr>
+        <p:spPr>
+          <a:xfrm>
+            <a:off x="685800" y="4343400"/>
+            <a:ext cx="5486400" cy="4114800"/>
+          </a:xfrm>
+          <a:prstGeom prst="rect">
+            <a:avLst/>
+          </a:prstGeom>
+        </p:spPr>
+        <p:txBody>
+          <a:bodyPr anchorCtr="0" anchor="t" bIns="91425" lIns="91425" spcFirstLastPara="1" rIns="91425" wrap="square" tIns="91425">
+            <a:noAutofit/>
+          </a:bodyPr>
+          <a:lstStyle/>
+          <a:p>
+            <a:pPr indent="0" lvl="0" marL="0" rtl="0" algn="l">
+              <a:spcBef>
+                <a:spcPts val="0"/>
+              </a:spcBef>
+              <a:spcAft>
+                <a:spcPts val="0"/>
+              </a:spcAft>
+              <a:buNone/>
+            </a:pPr>
+            <a:r>
+              <a:t/>
+            </a:r>
+            <a:endParaRPr/>
+          </a:p>
+        </p:txBody>
+      </p:sp>
+    </p:spTree>
+  </p:cSld>
+  <p:clrMapOvr>
+    <a:masterClrMapping/>
+  </p:clrMapOvr>
+</p:notes>
+</file>
+
+<file path=ppt/notesSlides/notesSlide24.xml><?xml version="1.0" encoding="utf-8"?>
+<p:notes xmlns:a="http://schemas.openxmlformats.org/drawingml/2006/main" xmlns:r="http://schemas.openxmlformats.org/officeDocument/2006/relationships" xmlns:mc="http://schemas.openxmlformats.org/markup-compatibility/2006" xmlns:mv="urn:schemas-microsoft-com:mac:vml" xmlns:p="http://schemas.openxmlformats.org/presentationml/2006/main" xmlns:c="http://schemas.openxmlformats.org/drawingml/2006/chart" xmlns:dgm="http://schemas.openxmlformats.org/drawingml/2006/diagram" xmlns:o="urn:schemas-microsoft-com:office:office" xmlns:v="urn:schemas-microsoft-com:vml" xmlns:pvml="urn:schemas-microsoft-com:office:powerpoint" xmlns:com="http://schemas.openxmlformats.org/drawingml/2006/compatibility" xmlns:p14="http://schemas.microsoft.com/office/powerpoint/2010/main" xmlns:p15="http://schemas.microsoft.com/office/powerpoint/2012/main" showMasterPhAnim="0" showMasterSp="0">
+  <p:cSld>
+    <p:spTree>
+      <p:nvGrpSpPr>
+        <p:cNvPr id="196" name="Shape 196"/>
+        <p:cNvGrpSpPr/>
+        <p:nvPr/>
+      </p:nvGrpSpPr>
+      <p:grpSpPr>
+        <a:xfrm>
+          <a:off x="0" y="0"/>
+          <a:ext cx="0" cy="0"/>
+          <a:chOff x="0" y="0"/>
+          <a:chExt cx="0" cy="0"/>
+        </a:xfrm>
+      </p:grpSpPr>
+      <p:sp>
+        <p:nvSpPr>
+          <p:cNvPr id="197" name="Google Shape;197;g5699ac68fd_0_202:notes"/>
+          <p:cNvSpPr/>
+          <p:nvPr>
+            <p:ph idx="2" type="sldImg"/>
+          </p:nvPr>
+        </p:nvSpPr>
+        <p:spPr>
+          <a:xfrm>
+            <a:off x="381300" y="685800"/>
+            <a:ext cx="6096000" cy="3429000"/>
+          </a:xfrm>
+          <a:custGeom>
+            <a:rect b="b" l="l" r="r" t="t"/>
+            <a:pathLst>
+              <a:path extrusionOk="0" h="120000" w="120000">
+                <a:moveTo>
+                  <a:pt x="0" y="0"/>
+                </a:moveTo>
+                <a:lnTo>
+                  <a:pt x="120000" y="0"/>
+                </a:lnTo>
+                <a:lnTo>
+                  <a:pt x="120000" y="120000"/>
+                </a:lnTo>
+                <a:lnTo>
+                  <a:pt x="0" y="120000"/>
+                </a:lnTo>
+                <a:close/>
+              </a:path>
+            </a:pathLst>
+          </a:custGeom>
+        </p:spPr>
+      </p:sp>
+      <p:sp>
+        <p:nvSpPr>
+          <p:cNvPr id="198" name="Google Shape;198;g5699ac68fd_0_202:notes"/>
+          <p:cNvSpPr txBox="1"/>
+          <p:nvPr>
+            <p:ph idx="1" type="body"/>
+          </p:nvPr>
+        </p:nvSpPr>
+        <p:spPr>
+          <a:xfrm>
+            <a:off x="685800" y="4343400"/>
+            <a:ext cx="5486400" cy="4114800"/>
+          </a:xfrm>
+          <a:prstGeom prst="rect">
+            <a:avLst/>
+          </a:prstGeom>
+        </p:spPr>
+        <p:txBody>
+          <a:bodyPr anchorCtr="0" anchor="t" bIns="91425" lIns="91425" spcFirstLastPara="1" rIns="91425" wrap="square" tIns="91425">
+            <a:noAutofit/>
+          </a:bodyPr>
+          <a:lstStyle/>
+          <a:p>
+            <a:pPr indent="0" lvl="0" marL="0" rtl="0" algn="l">
+              <a:spcBef>
+                <a:spcPts val="0"/>
+              </a:spcBef>
+              <a:spcAft>
+                <a:spcPts val="0"/>
+              </a:spcAft>
+              <a:buNone/>
+            </a:pPr>
+            <a:r>
+              <a:t/>
+            </a:r>
+            <a:endParaRPr/>
+          </a:p>
+        </p:txBody>
+      </p:sp>
+    </p:spTree>
+  </p:cSld>
+  <p:clrMapOvr>
+    <a:masterClrMapping/>
+  </p:clrMapOvr>
+</p:notes>
+</file>
+
+<file path=ppt/notesSlides/notesSlide25.xml><?xml version="1.0" encoding="utf-8"?>
+<p:notes xmlns:a="http://schemas.openxmlformats.org/drawingml/2006/main" xmlns:r="http://schemas.openxmlformats.org/officeDocument/2006/relationships" xmlns:mc="http://schemas.openxmlformats.org/markup-compatibility/2006" xmlns:mv="urn:schemas-microsoft-com:mac:vml" xmlns:p="http://schemas.openxmlformats.org/presentationml/2006/main" xmlns:c="http://schemas.openxmlformats.org/drawingml/2006/chart" xmlns:dgm="http://schemas.openxmlformats.org/drawingml/2006/diagram" xmlns:o="urn:schemas-microsoft-com:office:office" xmlns:v="urn:schemas-microsoft-com:vml" xmlns:pvml="urn:schemas-microsoft-com:office:powerpoint" xmlns:com="http://schemas.openxmlformats.org/drawingml/2006/compatibility" xmlns:p14="http://schemas.microsoft.com/office/powerpoint/2010/main" xmlns:p15="http://schemas.microsoft.com/office/powerpoint/2012/main" showMasterPhAnim="0" showMasterSp="0">
+  <p:cSld>
+    <p:spTree>
+      <p:nvGrpSpPr>
+        <p:cNvPr id="203" name="Shape 203"/>
+        <p:cNvGrpSpPr/>
+        <p:nvPr/>
+      </p:nvGrpSpPr>
+      <p:grpSpPr>
+        <a:xfrm>
+          <a:off x="0" y="0"/>
+          <a:ext cx="0" cy="0"/>
+          <a:chOff x="0" y="0"/>
+          <a:chExt cx="0" cy="0"/>
+        </a:xfrm>
+      </p:grpSpPr>
+      <p:sp>
+        <p:nvSpPr>
+          <p:cNvPr id="204" name="Google Shape;204;g58b7299f48_0_18:notes"/>
+          <p:cNvSpPr/>
+          <p:nvPr>
+            <p:ph idx="2" type="sldImg"/>
+          </p:nvPr>
+        </p:nvSpPr>
+        <p:spPr>
+          <a:xfrm>
+            <a:off x="381300" y="685800"/>
+            <a:ext cx="6096000" cy="3429000"/>
+          </a:xfrm>
+          <a:custGeom>
+            <a:rect b="b" l="l" r="r" t="t"/>
+            <a:pathLst>
+              <a:path extrusionOk="0" h="120000" w="120000">
+                <a:moveTo>
+                  <a:pt x="0" y="0"/>
+                </a:moveTo>
+                <a:lnTo>
+                  <a:pt x="120000" y="0"/>
+                </a:lnTo>
+                <a:lnTo>
+                  <a:pt x="120000" y="120000"/>
+                </a:lnTo>
+                <a:lnTo>
+                  <a:pt x="0" y="120000"/>
+                </a:lnTo>
+                <a:close/>
+              </a:path>
+            </a:pathLst>
+          </a:custGeom>
+        </p:spPr>
+      </p:sp>
+      <p:sp>
+        <p:nvSpPr>
+          <p:cNvPr id="205" name="Google Shape;205;g58b7299f48_0_18:notes"/>
+          <p:cNvSpPr txBox="1"/>
+          <p:nvPr>
+            <p:ph idx="1" type="body"/>
+          </p:nvPr>
+        </p:nvSpPr>
+        <p:spPr>
+          <a:xfrm>
+            <a:off x="685800" y="4343400"/>
+            <a:ext cx="5486400" cy="4114800"/>
+          </a:xfrm>
+          <a:prstGeom prst="rect">
+            <a:avLst/>
+          </a:prstGeom>
+        </p:spPr>
+        <p:txBody>
+          <a:bodyPr anchorCtr="0" anchor="t" bIns="91425" lIns="91425" spcFirstLastPara="1" rIns="91425" wrap="square" tIns="91425">
+            <a:noAutofit/>
+          </a:bodyPr>
+          <a:lstStyle/>
+          <a:p>
+            <a:pPr indent="0" lvl="0" marL="0" rtl="0" algn="l">
+              <a:spcBef>
+                <a:spcPts val="0"/>
+              </a:spcBef>
+              <a:spcAft>
+                <a:spcPts val="0"/>
+              </a:spcAft>
+              <a:buNone/>
+            </a:pPr>
+            <a:r>
+              <a:t/>
+            </a:r>
+            <a:endParaRPr/>
+          </a:p>
+        </p:txBody>
+      </p:sp>
+    </p:spTree>
+  </p:cSld>
+  <p:clrMapOvr>
+    <a:masterClrMapping/>
+  </p:clrMapOvr>
+</p:notes>
+</file>
+
+<file path=ppt/notesSlides/notesSlide26.xml><?xml version="1.0" encoding="utf-8"?>
+<p:notes xmlns:a="http://schemas.openxmlformats.org/drawingml/2006/main" xmlns:r="http://schemas.openxmlformats.org/officeDocument/2006/relationships" xmlns:mc="http://schemas.openxmlformats.org/markup-compatibility/2006" xmlns:mv="urn:schemas-microsoft-com:mac:vml" xmlns:p="http://schemas.openxmlformats.org/presentationml/2006/main" xmlns:c="http://schemas.openxmlformats.org/drawingml/2006/chart" xmlns:dgm="http://schemas.openxmlformats.org/drawingml/2006/diagram" xmlns:o="urn:schemas-microsoft-com:office:office" xmlns:v="urn:schemas-microsoft-com:vml" xmlns:pvml="urn:schemas-microsoft-com:office:powerpoint" xmlns:com="http://schemas.openxmlformats.org/drawingml/2006/compatibility" xmlns:p14="http://schemas.microsoft.com/office/powerpoint/2010/main" xmlns:p15="http://schemas.microsoft.com/office/powerpoint/2012/main" showMasterPhAnim="0" showMasterSp="0">
+  <p:cSld>
+    <p:spTree>
+      <p:nvGrpSpPr>
+        <p:cNvPr id="209" name="Shape 209"/>
+        <p:cNvGrpSpPr/>
+        <p:nvPr/>
+      </p:nvGrpSpPr>
+      <p:grpSpPr>
+        <a:xfrm>
+          <a:off x="0" y="0"/>
+          <a:ext cx="0" cy="0"/>
+          <a:chOff x="0" y="0"/>
+          <a:chExt cx="0" cy="0"/>
+        </a:xfrm>
+      </p:grpSpPr>
+      <p:sp>
+        <p:nvSpPr>
+          <p:cNvPr id="210" name="Google Shape;210;g58b7299f48_0_24:notes"/>
+          <p:cNvSpPr/>
+          <p:nvPr>
+            <p:ph idx="2" type="sldImg"/>
+          </p:nvPr>
+        </p:nvSpPr>
+        <p:spPr>
+          <a:xfrm>
+            <a:off x="381300" y="685800"/>
+            <a:ext cx="6096000" cy="3429000"/>
+          </a:xfrm>
+          <a:custGeom>
+            <a:rect b="b" l="l" r="r" t="t"/>
+            <a:pathLst>
+              <a:path extrusionOk="0" h="120000" w="120000">
+                <a:moveTo>
+                  <a:pt x="0" y="0"/>
+                </a:moveTo>
+                <a:lnTo>
+                  <a:pt x="120000" y="0"/>
+                </a:lnTo>
+                <a:lnTo>
+                  <a:pt x="120000" y="120000"/>
+                </a:lnTo>
+                <a:lnTo>
+                  <a:pt x="0" y="120000"/>
+                </a:lnTo>
+                <a:close/>
+              </a:path>
+            </a:pathLst>
+          </a:custGeom>
+        </p:spPr>
+      </p:sp>
+      <p:sp>
+        <p:nvSpPr>
+          <p:cNvPr id="211" name="Google Shape;211;g58b7299f48_0_24:notes"/>
+          <p:cNvSpPr txBox="1"/>
+          <p:nvPr>
+            <p:ph idx="1" type="body"/>
+          </p:nvPr>
+        </p:nvSpPr>
+        <p:spPr>
+          <a:xfrm>
+            <a:off x="685800" y="4343400"/>
+            <a:ext cx="5486400" cy="4114800"/>
+          </a:xfrm>
+          <a:prstGeom prst="rect">
+            <a:avLst/>
+          </a:prstGeom>
+        </p:spPr>
+        <p:txBody>
+          <a:bodyPr anchorCtr="0" anchor="t" bIns="91425" lIns="91425" spcFirstLastPara="1" rIns="91425" wrap="square" tIns="91425">
+            <a:noAutofit/>
+          </a:bodyPr>
+          <a:lstStyle/>
+          <a:p>
+            <a:pPr indent="0" lvl="0" marL="0" rtl="0" algn="l">
+              <a:spcBef>
+                <a:spcPts val="0"/>
+              </a:spcBef>
+              <a:spcAft>
+                <a:spcPts val="0"/>
+              </a:spcAft>
+              <a:buNone/>
+            </a:pPr>
+            <a:r>
+              <a:t/>
+            </a:r>
+            <a:endParaRPr/>
+          </a:p>
+        </p:txBody>
+      </p:sp>
+    </p:spTree>
+  </p:cSld>
+  <p:clrMapOvr>
+    <a:masterClrMapping/>
+  </p:clrMapOvr>
+</p:notes>
+</file>
+
+<file path=ppt/notesSlides/notesSlide27.xml><?xml version="1.0" encoding="utf-8"?>
+<p:notes xmlns:a="http://schemas.openxmlformats.org/drawingml/2006/main" xmlns:r="http://schemas.openxmlformats.org/officeDocument/2006/relationships" xmlns:mc="http://schemas.openxmlformats.org/markup-compatibility/2006" xmlns:mv="urn:schemas-microsoft-com:mac:vml" xmlns:p="http://schemas.openxmlformats.org/presentationml/2006/main" xmlns:c="http://schemas.openxmlformats.org/drawingml/2006/chart" xmlns:dgm="http://schemas.openxmlformats.org/drawingml/2006/diagram" xmlns:o="urn:schemas-microsoft-com:office:office" xmlns:v="urn:schemas-microsoft-com:vml" xmlns:pvml="urn:schemas-microsoft-com:office:powerpoint" xmlns:com="http://schemas.openxmlformats.org/drawingml/2006/compatibility" xmlns:p14="http://schemas.microsoft.com/office/powerpoint/2010/main" xmlns:p15="http://schemas.microsoft.com/office/powerpoint/2012/main" showMasterPhAnim="0" showMasterSp="0">
+  <p:cSld>
+    <p:spTree>
+      <p:nvGrpSpPr>
+        <p:cNvPr id="215" name="Shape 215"/>
+        <p:cNvGrpSpPr/>
+        <p:nvPr/>
+      </p:nvGrpSpPr>
+      <p:grpSpPr>
+        <a:xfrm>
+          <a:off x="0" y="0"/>
+          <a:ext cx="0" cy="0"/>
+          <a:chOff x="0" y="0"/>
+          <a:chExt cx="0" cy="0"/>
+        </a:xfrm>
+      </p:grpSpPr>
+      <p:sp>
+        <p:nvSpPr>
+          <p:cNvPr id="216" name="Google Shape;216;g58b7299f48_0_29:notes"/>
+          <p:cNvSpPr/>
+          <p:nvPr>
+            <p:ph idx="2" type="sldImg"/>
+          </p:nvPr>
+        </p:nvSpPr>
+        <p:spPr>
+          <a:xfrm>
+            <a:off x="381300" y="685800"/>
+            <a:ext cx="6096000" cy="3429000"/>
+          </a:xfrm>
+          <a:custGeom>
+            <a:rect b="b" l="l" r="r" t="t"/>
+            <a:pathLst>
+              <a:path extrusionOk="0" h="120000" w="120000">
+                <a:moveTo>
+                  <a:pt x="0" y="0"/>
+                </a:moveTo>
+                <a:lnTo>
+                  <a:pt x="120000" y="0"/>
+                </a:lnTo>
+                <a:lnTo>
+                  <a:pt x="120000" y="120000"/>
+                </a:lnTo>
+                <a:lnTo>
+                  <a:pt x="0" y="120000"/>
+                </a:lnTo>
+                <a:close/>
+              </a:path>
+            </a:pathLst>
+          </a:custGeom>
+        </p:spPr>
+      </p:sp>
+      <p:sp>
+        <p:nvSpPr>
+          <p:cNvPr id="217" name="Google Shape;217;g58b7299f48_0_29:notes"/>
+          <p:cNvSpPr txBox="1"/>
+          <p:nvPr>
+            <p:ph idx="1" type="body"/>
+          </p:nvPr>
+        </p:nvSpPr>
+        <p:spPr>
+          <a:xfrm>
+            <a:off x="685800" y="4343400"/>
+            <a:ext cx="5486400" cy="4114800"/>
+          </a:xfrm>
+          <a:prstGeom prst="rect">
+            <a:avLst/>
+          </a:prstGeom>
+        </p:spPr>
+        <p:txBody>
+          <a:bodyPr anchorCtr="0" anchor="t" bIns="91425" lIns="91425" spcFirstLastPara="1" rIns="91425" wrap="square" tIns="91425">
+            <a:noAutofit/>
+          </a:bodyPr>
+          <a:lstStyle/>
+          <a:p>
+            <a:pPr indent="0" lvl="0" marL="0" rtl="0" algn="l">
+              <a:spcBef>
+                <a:spcPts val="0"/>
+              </a:spcBef>
+              <a:spcAft>
+                <a:spcPts val="0"/>
+              </a:spcAft>
+              <a:buNone/>
+            </a:pPr>
+            <a:r>
+              <a:t/>
+            </a:r>
+            <a:endParaRPr/>
+          </a:p>
+        </p:txBody>
+      </p:sp>
+    </p:spTree>
+  </p:cSld>
+  <p:clrMapOvr>
+    <a:masterClrMapping/>
+  </p:clrMapOvr>
+</p:notes>
+</file>
+
+<file path=ppt/notesSlides/notesSlide28.xml><?xml version="1.0" encoding="utf-8"?>
+<p:notes xmlns:a="http://schemas.openxmlformats.org/drawingml/2006/main" xmlns:r="http://schemas.openxmlformats.org/officeDocument/2006/relationships" xmlns:mc="http://schemas.openxmlformats.org/markup-compatibility/2006" xmlns:mv="urn:schemas-microsoft-com:mac:vml" xmlns:p="http://schemas.openxmlformats.org/presentationml/2006/main" xmlns:c="http://schemas.openxmlformats.org/drawingml/2006/chart" xmlns:dgm="http://schemas.openxmlformats.org/drawingml/2006/diagram" xmlns:o="urn:schemas-microsoft-com:office:office" xmlns:v="urn:schemas-microsoft-com:vml" xmlns:pvml="urn:schemas-microsoft-com:office:powerpoint" xmlns:com="http://schemas.openxmlformats.org/drawingml/2006/compatibility" xmlns:p14="http://schemas.microsoft.com/office/powerpoint/2010/main" xmlns:p15="http://schemas.microsoft.com/office/powerpoint/2012/main" showMasterPhAnim="0" showMasterSp="0">
+  <p:cSld>
+    <p:spTree>
+      <p:nvGrpSpPr>
+        <p:cNvPr id="221" name="Shape 221"/>
+        <p:cNvGrpSpPr/>
+        <p:nvPr/>
+      </p:nvGrpSpPr>
+      <p:grpSpPr>
+        <a:xfrm>
+          <a:off x="0" y="0"/>
+          <a:ext cx="0" cy="0"/>
+          <a:chOff x="0" y="0"/>
+          <a:chExt cx="0" cy="0"/>
+        </a:xfrm>
+      </p:grpSpPr>
+      <p:sp>
+        <p:nvSpPr>
+          <p:cNvPr id="222" name="Google Shape;222;g58b7299f48_0_34:notes"/>
+          <p:cNvSpPr/>
+          <p:nvPr>
+            <p:ph idx="2" type="sldImg"/>
+          </p:nvPr>
+        </p:nvSpPr>
+        <p:spPr>
+          <a:xfrm>
+            <a:off x="381300" y="685800"/>
+            <a:ext cx="6096000" cy="3429000"/>
+          </a:xfrm>
+          <a:custGeom>
+            <a:rect b="b" l="l" r="r" t="t"/>
+            <a:pathLst>
+              <a:path extrusionOk="0" h="120000" w="120000">
+                <a:moveTo>
+                  <a:pt x="0" y="0"/>
+                </a:moveTo>
+                <a:lnTo>
+                  <a:pt x="120000" y="0"/>
+                </a:lnTo>
+                <a:lnTo>
+                  <a:pt x="120000" y="120000"/>
+                </a:lnTo>
+                <a:lnTo>
+                  <a:pt x="0" y="120000"/>
+                </a:lnTo>
+                <a:close/>
+              </a:path>
+            </a:pathLst>
+          </a:custGeom>
+        </p:spPr>
+      </p:sp>
+      <p:sp>
+        <p:nvSpPr>
+          <p:cNvPr id="223" name="Google Shape;223;g58b7299f48_0_34:notes"/>
+          <p:cNvSpPr txBox="1"/>
+          <p:nvPr>
+            <p:ph idx="1" type="body"/>
+          </p:nvPr>
+        </p:nvSpPr>
+        <p:spPr>
+          <a:xfrm>
+            <a:off x="685800" y="4343400"/>
+            <a:ext cx="5486400" cy="4114800"/>
+          </a:xfrm>
+          <a:prstGeom prst="rect">
+            <a:avLst/>
+          </a:prstGeom>
+        </p:spPr>
+        <p:txBody>
+          <a:bodyPr anchorCtr="0" anchor="t" bIns="91425" lIns="91425" spcFirstLastPara="1" rIns="91425" wrap="square" tIns="91425">
+            <a:noAutofit/>
+          </a:bodyPr>
+          <a:lstStyle/>
+          <a:p>
+            <a:pPr indent="0" lvl="0" marL="0" rtl="0" algn="l">
+              <a:spcBef>
+                <a:spcPts val="0"/>
+              </a:spcBef>
+              <a:spcAft>
+                <a:spcPts val="0"/>
+              </a:spcAft>
+              <a:buNone/>
+            </a:pPr>
+            <a:r>
+              <a:t/>
+            </a:r>
+            <a:endParaRPr/>
+          </a:p>
+        </p:txBody>
+      </p:sp>
+    </p:spTree>
+  </p:cSld>
+  <p:clrMapOvr>
+    <a:masterClrMapping/>
+  </p:clrMapOvr>
+</p:notes>
+</file>
+
+<file path=ppt/notesSlides/notesSlide29.xml><?xml version="1.0" encoding="utf-8"?>
+<p:notes xmlns:a="http://schemas.openxmlformats.org/drawingml/2006/main" xmlns:r="http://schemas.openxmlformats.org/officeDocument/2006/relationships" xmlns:mc="http://schemas.openxmlformats.org/markup-compatibility/2006" xmlns:mv="urn:schemas-microsoft-com:mac:vml" xmlns:p="http://schemas.openxmlformats.org/presentationml/2006/main" xmlns:c="http://schemas.openxmlformats.org/drawingml/2006/chart" xmlns:dgm="http://schemas.openxmlformats.org/drawingml/2006/diagram" xmlns:o="urn:schemas-microsoft-com:office:office" xmlns:v="urn:schemas-microsoft-com:vml" xmlns:pvml="urn:schemas-microsoft-com:office:powerpoint" xmlns:com="http://schemas.openxmlformats.org/drawingml/2006/compatibility" xmlns:p14="http://schemas.microsoft.com/office/powerpoint/2010/main" xmlns:p15="http://schemas.microsoft.com/office/powerpoint/2012/main" showMasterPhAnim="0" showMasterSp="0">
+  <p:cSld>
+    <p:spTree>
+      <p:nvGrpSpPr>
+        <p:cNvPr id="227" name="Shape 227"/>
+        <p:cNvGrpSpPr/>
+        <p:nvPr/>
+      </p:nvGrpSpPr>
+      <p:grpSpPr>
+        <a:xfrm>
+          <a:off x="0" y="0"/>
+          <a:ext cx="0" cy="0"/>
+          <a:chOff x="0" y="0"/>
+          <a:chExt cx="0" cy="0"/>
+        </a:xfrm>
+      </p:grpSpPr>
+      <p:sp>
+        <p:nvSpPr>
+          <p:cNvPr id="228" name="Google Shape;228;g58b7299f48_0_39:notes"/>
+          <p:cNvSpPr/>
+          <p:nvPr>
+            <p:ph idx="2" type="sldImg"/>
+          </p:nvPr>
+        </p:nvSpPr>
+        <p:spPr>
+          <a:xfrm>
+            <a:off x="381300" y="685800"/>
+            <a:ext cx="6096000" cy="3429000"/>
+          </a:xfrm>
+          <a:custGeom>
+            <a:rect b="b" l="l" r="r" t="t"/>
+            <a:pathLst>
+              <a:path extrusionOk="0" h="120000" w="120000">
+                <a:moveTo>
+                  <a:pt x="0" y="0"/>
+                </a:moveTo>
+                <a:lnTo>
+                  <a:pt x="120000" y="0"/>
+                </a:lnTo>
+                <a:lnTo>
+                  <a:pt x="120000" y="120000"/>
+                </a:lnTo>
+                <a:lnTo>
+                  <a:pt x="0" y="120000"/>
+                </a:lnTo>
+                <a:close/>
+              </a:path>
+            </a:pathLst>
+          </a:custGeom>
+        </p:spPr>
+      </p:sp>
+      <p:sp>
+        <p:nvSpPr>
+          <p:cNvPr id="229" name="Google Shape;229;g58b7299f48_0_39:notes"/>
           <p:cNvSpPr txBox="1"/>
           <p:nvPr>
             <p:ph idx="1" type="body"/>
@@ -7829,7 +8629,15 @@
             </a:pPr>
             <a:r>
               <a:rPr lang="en"/>
-              <a:t>Take a reactangular or square chip that has pads in four sides.</a:t>
+              <a:t>Take a </a:t>
+            </a:r>
+            <a:r>
+              <a:rPr lang="en"/>
+              <a:t>rectangular</a:t>
+            </a:r>
+            <a:r>
+              <a:rPr lang="en"/>
+              <a:t> or square chip that has pads in four sides.</a:t>
             </a:r>
             <a:endParaRPr/>
           </a:p>
@@ -8276,7 +9084,7 @@
             </a:pPr>
             <a:r>
               <a:rPr lang="en"/>
-              <a:t>Project Achievements</a:t>
+              <a:t>DEF File Format</a:t>
             </a:r>
             <a:endParaRPr/>
           </a:p>
@@ -8298,6 +9106,15 @@
           <a:prstGeom prst="rect">
             <a:avLst/>
           </a:prstGeom>
+          <a:ln cap="flat" cmpd="sng" w="9525">
+            <a:solidFill>
+              <a:srgbClr val="FFFFFF"/>
+            </a:solidFill>
+            <a:prstDash val="solid"/>
+            <a:round/>
+            <a:headEnd len="sm" w="sm" type="none"/>
+            <a:tailEnd len="sm" w="sm" type="none"/>
+          </a:ln>
         </p:spPr>
         <p:txBody>
           <a:bodyPr anchorCtr="0" anchor="t" bIns="91425" lIns="91425" spcFirstLastPara="1" rIns="91425" wrap="square" tIns="91425">
@@ -8306,6 +9123,9 @@
           <a:lstStyle/>
           <a:p>
             <a:pPr indent="-342900" lvl="0" marL="457200" rtl="0" algn="l">
+              <a:lnSpc>
+                <a:spcPct val="150000"/>
+              </a:lnSpc>
               <a:spcBef>
                 <a:spcPts val="0"/>
               </a:spcBef>
@@ -8317,126 +9137,107 @@
             </a:pPr>
             <a:r>
               <a:rPr lang="en"/>
-              <a:t>It outputs the def file format with the following sections included:</a:t>
-            </a:r>
-            <a:endParaRPr/>
-          </a:p>
-          <a:p>
-            <a:pPr indent="-317500" lvl="1" marL="914400" rtl="0" algn="l">
-              <a:spcBef>
-                <a:spcPts val="0"/>
-              </a:spcBef>
-              <a:spcAft>
-                <a:spcPts val="0"/>
-              </a:spcAft>
-              <a:buSzPts val="1400"/>
-              <a:buAutoNum type="alphaLcPeriod"/>
-            </a:pPr>
-            <a:r>
-              <a:rPr lang="en"/>
-              <a:t>Header</a:t>
-            </a:r>
-            <a:endParaRPr/>
-          </a:p>
-          <a:p>
-            <a:pPr indent="-317500" lvl="1" marL="914400" rtl="0" algn="l">
-              <a:spcBef>
-                <a:spcPts val="0"/>
-              </a:spcBef>
-              <a:spcAft>
-                <a:spcPts val="0"/>
-              </a:spcAft>
-              <a:buSzPts val="1400"/>
-              <a:buAutoNum type="alphaLcPeriod"/>
-            </a:pPr>
-            <a:r>
-              <a:rPr lang="en"/>
-              <a:t>Rows</a:t>
-            </a:r>
-            <a:endParaRPr/>
-          </a:p>
-          <a:p>
-            <a:pPr indent="-317500" lvl="1" marL="914400" rtl="0" algn="l">
-              <a:spcBef>
-                <a:spcPts val="0"/>
-              </a:spcBef>
-              <a:spcAft>
-                <a:spcPts val="0"/>
-              </a:spcAft>
-              <a:buSzPts val="1400"/>
-              <a:buAutoNum type="alphaLcPeriod"/>
-            </a:pPr>
-            <a:r>
-              <a:rPr lang="en"/>
-              <a:t>Tracks</a:t>
-            </a:r>
-            <a:endParaRPr/>
-          </a:p>
-          <a:p>
-            <a:pPr indent="-317500" lvl="1" marL="914400" rtl="0" algn="l">
-              <a:spcBef>
-                <a:spcPts val="0"/>
-              </a:spcBef>
-              <a:spcAft>
-                <a:spcPts val="0"/>
-              </a:spcAft>
-              <a:buSzPts val="1400"/>
-              <a:buAutoNum type="alphaLcPeriod"/>
-            </a:pPr>
-            <a:r>
-              <a:rPr lang="en"/>
-              <a:t>Vias</a:t>
-            </a:r>
-            <a:endParaRPr/>
-          </a:p>
-          <a:p>
-            <a:pPr indent="-317500" lvl="1" marL="914400" rtl="0" algn="l">
-              <a:spcBef>
-                <a:spcPts val="0"/>
-              </a:spcBef>
-              <a:spcAft>
-                <a:spcPts val="0"/>
-              </a:spcAft>
-              <a:buSzPts val="1400"/>
-              <a:buAutoNum type="alphaLcPeriod"/>
-            </a:pPr>
-            <a:r>
-              <a:rPr lang="en"/>
-              <a:t>Components</a:t>
-            </a:r>
-            <a:endParaRPr/>
-          </a:p>
-          <a:p>
-            <a:pPr indent="-317500" lvl="1" marL="914400" rtl="0" algn="l">
-              <a:spcBef>
-                <a:spcPts val="0"/>
-              </a:spcBef>
-              <a:spcAft>
-                <a:spcPts val="0"/>
-              </a:spcAft>
-              <a:buSzPts val="1400"/>
-              <a:buAutoNum type="alphaLcPeriod"/>
-            </a:pPr>
-            <a:r>
-              <a:rPr lang="en"/>
-              <a:t>Pins</a:t>
-            </a:r>
-            <a:endParaRPr/>
-          </a:p>
-          <a:p>
-            <a:pPr indent="-317500" lvl="1" marL="914400" rtl="0" algn="l">
-              <a:spcBef>
-                <a:spcPts val="0"/>
-              </a:spcBef>
-              <a:spcAft>
-                <a:spcPts val="0"/>
-              </a:spcAft>
-              <a:buSzPts val="1400"/>
-              <a:buAutoNum type="alphaLcPeriod"/>
-            </a:pPr>
-            <a:r>
-              <a:rPr lang="en"/>
-              <a:t>Nets</a:t>
+              <a:t>Design Exchange Format (DEF) is an open specification for representing physical layout of an integrated circuit in an ASCII format.</a:t>
+            </a:r>
+            <a:endParaRPr/>
+          </a:p>
+          <a:p>
+            <a:pPr indent="-342900" lvl="0" marL="457200" rtl="0" algn="l">
+              <a:lnSpc>
+                <a:spcPct val="150000"/>
+              </a:lnSpc>
+              <a:spcBef>
+                <a:spcPts val="0"/>
+              </a:spcBef>
+              <a:spcAft>
+                <a:spcPts val="0"/>
+              </a:spcAft>
+              <a:buSzPts val="1800"/>
+              <a:buAutoNum type="arabicPeriod"/>
+            </a:pPr>
+            <a:r>
+              <a:rPr lang="en"/>
+              <a:t>represents the netlist and circuit layout.</a:t>
+            </a:r>
+            <a:endParaRPr/>
+          </a:p>
+          <a:p>
+            <a:pPr indent="-342900" lvl="0" marL="457200" rtl="0" algn="l">
+              <a:lnSpc>
+                <a:spcPct val="150000"/>
+              </a:lnSpc>
+              <a:spcBef>
+                <a:spcPts val="0"/>
+              </a:spcBef>
+              <a:spcAft>
+                <a:spcPts val="0"/>
+              </a:spcAft>
+              <a:buSzPts val="1800"/>
+              <a:buAutoNum type="arabicPeriod"/>
+            </a:pPr>
+            <a:r>
+              <a:rPr lang="en"/>
+              <a:t>used in conjunction with Library Exchange Format (LEF) to represent complete physical layout of an integrated circuit while it is being designed. </a:t>
+            </a:r>
+            <a:endParaRPr/>
+          </a:p>
+          <a:p>
+            <a:pPr indent="-342900" lvl="0" marL="457200" rtl="0" algn="l">
+              <a:lnSpc>
+                <a:spcPct val="150000"/>
+              </a:lnSpc>
+              <a:spcBef>
+                <a:spcPts val="0"/>
+              </a:spcBef>
+              <a:spcAft>
+                <a:spcPts val="0"/>
+              </a:spcAft>
+              <a:buSzPts val="1800"/>
+              <a:buAutoNum type="arabicPeriod"/>
+            </a:pPr>
+            <a:r>
+              <a:rPr lang="en"/>
+              <a:t>was developed by Cadence Design System</a:t>
+            </a:r>
+            <a:endParaRPr/>
+          </a:p>
+          <a:p>
+            <a:pPr indent="-342900" lvl="0" marL="457200" rtl="0" algn="l">
+              <a:lnSpc>
+                <a:spcPct val="150000"/>
+              </a:lnSpc>
+              <a:spcBef>
+                <a:spcPts val="0"/>
+              </a:spcBef>
+              <a:spcAft>
+                <a:spcPts val="0"/>
+              </a:spcAft>
+              <a:buSzPts val="1800"/>
+              <a:buAutoNum type="arabicPeriod"/>
+            </a:pPr>
+            <a:r>
+              <a:rPr lang="en"/>
+              <a:t>usually generated by place and route (P&amp;R) tools</a:t>
+            </a:r>
+            <a:endParaRPr/>
+          </a:p>
+          <a:p>
+            <a:pPr indent="-342900" lvl="0" marL="457200" rtl="0" algn="l">
+              <a:lnSpc>
+                <a:spcPct val="150000"/>
+              </a:lnSpc>
+              <a:spcBef>
+                <a:spcPts val="0"/>
+              </a:spcBef>
+              <a:spcAft>
+                <a:spcPts val="0"/>
+              </a:spcAft>
+              <a:buSzPts val="1800"/>
+              <a:buAutoNum type="arabicPeriod"/>
+            </a:pPr>
+            <a:r>
+              <a:rPr lang="en"/>
+              <a:t>used as an input for post analysis tools, such as extraction tools or power analysis tools. </a:t>
             </a:r>
             <a:endParaRPr/>
           </a:p>
@@ -8501,7 +9302,7 @@
             </a:pPr>
             <a:r>
               <a:rPr lang="en"/>
-              <a:t>Project Achievements:: Header</a:t>
+              <a:t>Project Achievements</a:t>
             </a:r>
             <a:endParaRPr/>
           </a:p>
@@ -8530,50 +9331,160 @@
           </a:bodyPr>
           <a:lstStyle/>
           <a:p>
-            <a:pPr indent="0" lvl="0" marL="0" rtl="0" algn="l">
-              <a:spcBef>
-                <a:spcPts val="0"/>
-              </a:spcBef>
-              <a:spcAft>
-                <a:spcPts val="1600"/>
-              </a:spcAft>
-              <a:buNone/>
-            </a:pPr>
-            <a:r>
-              <a:t/>
+            <a:pPr indent="-342900" lvl="0" marL="457200" rtl="0" algn="l">
+              <a:spcBef>
+                <a:spcPts val="0"/>
+              </a:spcBef>
+              <a:spcAft>
+                <a:spcPts val="0"/>
+              </a:spcAft>
+              <a:buSzPts val="1800"/>
+              <a:buAutoNum type="arabicPeriod"/>
+            </a:pPr>
+            <a:r>
+              <a:rPr lang="en"/>
+              <a:t>It outputs the def file format with the following sections included:</a:t>
+            </a:r>
+            <a:endParaRPr/>
+          </a:p>
+          <a:p>
+            <a:pPr indent="-317500" lvl="1" marL="914400" rtl="0" algn="l">
+              <a:spcBef>
+                <a:spcPts val="0"/>
+              </a:spcBef>
+              <a:spcAft>
+                <a:spcPts val="0"/>
+              </a:spcAft>
+              <a:buSzPts val="1400"/>
+              <a:buAutoNum type="alphaLcPeriod"/>
+            </a:pPr>
+            <a:r>
+              <a:rPr lang="en"/>
+              <a:t>Header</a:t>
+            </a:r>
+            <a:endParaRPr/>
+          </a:p>
+          <a:p>
+            <a:pPr indent="-317500" lvl="1" marL="914400" rtl="0" algn="l">
+              <a:spcBef>
+                <a:spcPts val="0"/>
+              </a:spcBef>
+              <a:spcAft>
+                <a:spcPts val="0"/>
+              </a:spcAft>
+              <a:buSzPts val="1400"/>
+              <a:buAutoNum type="alphaLcPeriod"/>
+            </a:pPr>
+            <a:r>
+              <a:rPr lang="en"/>
+              <a:t>Rows</a:t>
+            </a:r>
+            <a:endParaRPr/>
+          </a:p>
+          <a:p>
+            <a:pPr indent="-317500" lvl="1" marL="914400" rtl="0" algn="l">
+              <a:spcBef>
+                <a:spcPts val="0"/>
+              </a:spcBef>
+              <a:spcAft>
+                <a:spcPts val="0"/>
+              </a:spcAft>
+              <a:buSzPts val="1400"/>
+              <a:buAutoNum type="alphaLcPeriod"/>
+            </a:pPr>
+            <a:r>
+              <a:rPr lang="en"/>
+              <a:t>Tracks</a:t>
+            </a:r>
+            <a:endParaRPr/>
+          </a:p>
+          <a:p>
+            <a:pPr indent="-317500" lvl="1" marL="914400" rtl="0" algn="l">
+              <a:spcBef>
+                <a:spcPts val="0"/>
+              </a:spcBef>
+              <a:spcAft>
+                <a:spcPts val="0"/>
+              </a:spcAft>
+              <a:buSzPts val="1400"/>
+              <a:buAutoNum type="alphaLcPeriod"/>
+            </a:pPr>
+            <a:r>
+              <a:rPr lang="en"/>
+              <a:t>Vias</a:t>
+            </a:r>
+            <a:endParaRPr/>
+          </a:p>
+          <a:p>
+            <a:pPr indent="-317500" lvl="1" marL="914400" rtl="0" algn="l">
+              <a:spcBef>
+                <a:spcPts val="0"/>
+              </a:spcBef>
+              <a:spcAft>
+                <a:spcPts val="0"/>
+              </a:spcAft>
+              <a:buSzPts val="1400"/>
+              <a:buAutoNum type="alphaLcPeriod"/>
+            </a:pPr>
+            <a:r>
+              <a:rPr lang="en"/>
+              <a:t>Components</a:t>
+            </a:r>
+            <a:endParaRPr/>
+          </a:p>
+          <a:p>
+            <a:pPr indent="-317500" lvl="1" marL="914400" rtl="0" algn="l">
+              <a:spcBef>
+                <a:spcPts val="0"/>
+              </a:spcBef>
+              <a:spcAft>
+                <a:spcPts val="0"/>
+              </a:spcAft>
+              <a:buSzPts val="1400"/>
+              <a:buAutoNum type="alphaLcPeriod"/>
+            </a:pPr>
+            <a:r>
+              <a:rPr lang="en"/>
+              <a:t>Pins</a:t>
+            </a:r>
+            <a:endParaRPr/>
+          </a:p>
+          <a:p>
+            <a:pPr indent="-317500" lvl="1" marL="914400" rtl="0" algn="l">
+              <a:spcBef>
+                <a:spcPts val="0"/>
+              </a:spcBef>
+              <a:spcAft>
+                <a:spcPts val="0"/>
+              </a:spcAft>
+              <a:buSzPts val="1400"/>
+              <a:buAutoNum type="alphaLcPeriod"/>
+            </a:pPr>
+            <a:r>
+              <a:rPr lang="en"/>
+              <a:t>Special Nets</a:t>
+            </a:r>
+            <a:endParaRPr/>
+          </a:p>
+          <a:p>
+            <a:pPr indent="-317500" lvl="1" marL="914400" rtl="0" algn="l">
+              <a:spcBef>
+                <a:spcPts val="0"/>
+              </a:spcBef>
+              <a:spcAft>
+                <a:spcPts val="0"/>
+              </a:spcAft>
+              <a:buSzPts val="1400"/>
+              <a:buAutoNum type="alphaLcPeriod"/>
+            </a:pPr>
+            <a:r>
+              <a:rPr lang="en"/>
+              <a:t>Nets</a:t>
             </a:r>
             <a:endParaRPr/>
           </a:p>
         </p:txBody>
       </p:sp>
-      <p:pic>
-        <p:nvPicPr>
-          <p:cNvPr id="140" name="Google Shape;140;p27"/>
-          <p:cNvPicPr preferRelativeResize="0"/>
-          <p:nvPr/>
-        </p:nvPicPr>
-        <p:blipFill>
-          <a:blip r:embed="rId3">
-            <a:alphaModFix/>
-          </a:blip>
-          <a:stretch>
-            <a:fillRect/>
-          </a:stretch>
-        </p:blipFill>
-        <p:spPr>
-          <a:xfrm>
-            <a:off x="241000" y="2109100"/>
-            <a:ext cx="8769125" cy="1675050"/>
-          </a:xfrm>
-          <a:prstGeom prst="rect">
-            <a:avLst/>
-          </a:prstGeom>
-          <a:noFill/>
-          <a:ln>
-            <a:noFill/>
-          </a:ln>
-        </p:spPr>
-      </p:pic>
     </p:spTree>
   </p:cSld>
   <p:clrMapOvr>
@@ -8587,7 +9498,7 @@
   <p:cSld>
     <p:spTree>
       <p:nvGrpSpPr>
-        <p:cNvPr id="144" name="Shape 144"/>
+        <p:cNvPr id="143" name="Shape 143"/>
         <p:cNvGrpSpPr/>
         <p:nvPr/>
       </p:nvGrpSpPr>
@@ -8601,7 +9512,7 @@
       </p:grpSpPr>
       <p:sp>
         <p:nvSpPr>
-          <p:cNvPr id="145" name="Google Shape;145;p28"/>
+          <p:cNvPr id="144" name="Google Shape;144;p28"/>
           <p:cNvSpPr txBox="1"/>
           <p:nvPr>
             <p:ph type="title"/>
@@ -8633,22 +9544,7 @@
             </a:pPr>
             <a:r>
               <a:rPr lang="en"/>
-              <a:t>Project Achievements:: Rows</a:t>
-            </a:r>
-            <a:endParaRPr/>
-          </a:p>
-          <a:p>
-            <a:pPr indent="0" lvl="0" marL="0" rtl="0" algn="l">
-              <a:spcBef>
-                <a:spcPts val="0"/>
-              </a:spcBef>
-              <a:spcAft>
-                <a:spcPts val="0"/>
-              </a:spcAft>
-              <a:buNone/>
-            </a:pPr>
-            <a:r>
-              <a:t/>
+              <a:t>Project Achievements:: Header</a:t>
             </a:r>
             <a:endParaRPr/>
           </a:p>
@@ -8656,7 +9552,7 @@
       </p:sp>
       <p:sp>
         <p:nvSpPr>
-          <p:cNvPr id="146" name="Google Shape;146;p28"/>
+          <p:cNvPr id="145" name="Google Shape;145;p28"/>
           <p:cNvSpPr txBox="1"/>
           <p:nvPr>
             <p:ph idx="1" type="body"/>
@@ -8665,7 +9561,7 @@
         <p:spPr>
           <a:xfrm>
             <a:off x="311700" y="1152475"/>
-            <a:ext cx="8520600" cy="3416400"/>
+            <a:ext cx="5873100" cy="3416400"/>
           </a:xfrm>
           <a:prstGeom prst="rect">
             <a:avLst/>
@@ -8677,17 +9573,53 @@
           </a:bodyPr>
           <a:lstStyle/>
           <a:p>
-            <a:pPr indent="0" lvl="0" marL="0" rtl="0" algn="l">
-              <a:spcBef>
-                <a:spcPts val="0"/>
-              </a:spcBef>
-              <a:spcAft>
-                <a:spcPts val="1600"/>
-              </a:spcAft>
-              <a:buNone/>
-            </a:pPr>
-            <a:r>
-              <a:t/>
+            <a:pPr indent="-342900" lvl="0" marL="457200" rtl="0" algn="l">
+              <a:spcBef>
+                <a:spcPts val="0"/>
+              </a:spcBef>
+              <a:spcAft>
+                <a:spcPts val="0"/>
+              </a:spcAft>
+              <a:buSzPts val="1800"/>
+              <a:buAutoNum type="arabicPeriod"/>
+            </a:pPr>
+            <a:r>
+              <a:rPr lang="en"/>
+              <a:t>All the lines untils design name are extracted from lef file</a:t>
+            </a:r>
+            <a:endParaRPr/>
+          </a:p>
+          <a:p>
+            <a:pPr indent="-342900" lvl="0" marL="457200" rtl="0" algn="l">
+              <a:spcBef>
+                <a:spcPts val="0"/>
+              </a:spcBef>
+              <a:spcAft>
+                <a:spcPts val="0"/>
+              </a:spcAft>
+              <a:buSzPts val="1800"/>
+              <a:buAutoNum type="arabicPeriod"/>
+            </a:pPr>
+            <a:r>
+              <a:rPr lang="en"/>
+              <a:t>Design name is the same as top level module in provided verilog file</a:t>
+            </a:r>
+            <a:endParaRPr/>
+          </a:p>
+          <a:p>
+            <a:pPr indent="-342900" lvl="0" marL="457200" rtl="0" algn="l">
+              <a:spcBef>
+                <a:spcPts val="0"/>
+              </a:spcBef>
+              <a:spcAft>
+                <a:spcPts val="0"/>
+              </a:spcAft>
+              <a:buSzPts val="1800"/>
+              <a:buAutoNum type="arabicPeriod"/>
+            </a:pPr>
+            <a:r>
+              <a:rPr lang="en"/>
+              <a:t>Units microns are placed by default to be 100 and all the values extracted from lef file use this new microns unit.</a:t>
             </a:r>
             <a:endParaRPr/>
           </a:p>
@@ -8695,7 +9627,7 @@
       </p:sp>
       <p:pic>
         <p:nvPicPr>
-          <p:cNvPr id="147" name="Google Shape;147;p28"/>
+          <p:cNvPr id="146" name="Google Shape;146;p28"/>
           <p:cNvPicPr preferRelativeResize="0"/>
           <p:nvPr/>
         </p:nvPicPr>
@@ -8709,8 +9641,8 @@
         </p:blipFill>
         <p:spPr>
           <a:xfrm>
-            <a:off x="747400" y="2958725"/>
-            <a:ext cx="7790374" cy="803275"/>
+            <a:off x="88900" y="3404950"/>
+            <a:ext cx="8743400" cy="1675050"/>
           </a:xfrm>
           <a:prstGeom prst="rect">
             <a:avLst/>
@@ -8734,7 +9666,7 @@
   <p:cSld>
     <p:spTree>
       <p:nvGrpSpPr>
-        <p:cNvPr id="151" name="Shape 151"/>
+        <p:cNvPr id="150" name="Shape 150"/>
         <p:cNvGrpSpPr/>
         <p:nvPr/>
       </p:nvGrpSpPr>
@@ -8748,7 +9680,7 @@
       </p:grpSpPr>
       <p:sp>
         <p:nvSpPr>
-          <p:cNvPr id="152" name="Google Shape;152;p29"/>
+          <p:cNvPr id="151" name="Google Shape;151;p29"/>
           <p:cNvSpPr txBox="1"/>
           <p:nvPr>
             <p:ph type="title"/>
@@ -8780,7 +9712,7 @@
             </a:pPr>
             <a:r>
               <a:rPr lang="en"/>
-              <a:t>Project Achievements:: Tracks</a:t>
+              <a:t>Project Achievements:: Header (Cont’d)</a:t>
             </a:r>
             <a:endParaRPr/>
           </a:p>
@@ -8795,7 +9727,8 @@
               <a:buNone/>
             </a:pPr>
             <a:r>
-              <a:t/>
+              <a:rPr lang="en"/>
+              <a:t> </a:t>
             </a:r>
             <a:endParaRPr/>
           </a:p>
@@ -8803,7 +9736,7 @@
       </p:sp>
       <p:sp>
         <p:nvSpPr>
-          <p:cNvPr id="153" name="Google Shape;153;p29"/>
+          <p:cNvPr id="152" name="Google Shape;152;p29"/>
           <p:cNvSpPr txBox="1"/>
           <p:nvPr>
             <p:ph idx="1" type="body"/>
@@ -8829,6 +9762,90 @@
                 <a:spcPts val="0"/>
               </a:spcBef>
               <a:spcAft>
+                <a:spcPts val="0"/>
+              </a:spcAft>
+              <a:buNone/>
+            </a:pPr>
+            <a:r>
+              <a:rPr lang="en"/>
+              <a:t>Die aea is calculated as the following:</a:t>
+            </a:r>
+            <a:endParaRPr/>
+          </a:p>
+          <a:p>
+            <a:pPr indent="-317500" lvl="1" marL="914400" rtl="0" algn="l">
+              <a:spcBef>
+                <a:spcPts val="1600"/>
+              </a:spcBef>
+              <a:spcAft>
+                <a:spcPts val="0"/>
+              </a:spcAft>
+              <a:buSzPts val="1400"/>
+              <a:buAutoNum type="alphaLcPeriod"/>
+            </a:pPr>
+            <a:r>
+              <a:rPr lang="en"/>
+              <a:t>Make sure that width/height always satisfy aspect ratio</a:t>
+            </a:r>
+            <a:endParaRPr/>
+          </a:p>
+          <a:p>
+            <a:pPr indent="-317500" lvl="1" marL="914400" rtl="0" algn="l">
+              <a:spcBef>
+                <a:spcPts val="0"/>
+              </a:spcBef>
+              <a:spcAft>
+                <a:spcPts val="0"/>
+              </a:spcAft>
+              <a:buSzPts val="1400"/>
+              <a:buAutoNum type="alphaLcPeriod"/>
+            </a:pPr>
+            <a:r>
+              <a:rPr lang="en"/>
+              <a:t>Coordinates are specified by the summation of all areas of used cells divided by the core utilization factor</a:t>
+            </a:r>
+            <a:endParaRPr/>
+          </a:p>
+          <a:p>
+            <a:pPr indent="-317500" lvl="1" marL="914400" rtl="0" algn="l">
+              <a:spcBef>
+                <a:spcPts val="0"/>
+              </a:spcBef>
+              <a:spcAft>
+                <a:spcPts val="0"/>
+              </a:spcAft>
+              <a:buSzPts val="1400"/>
+              <a:buAutoNum type="alphaLcPeriod"/>
+            </a:pPr>
+            <a:r>
+              <a:rPr lang="en"/>
+              <a:t>Bottom x,y coordinates are assumed to be 0 if no horizontal or vertical margins are provided.</a:t>
+            </a:r>
+            <a:endParaRPr/>
+          </a:p>
+          <a:p>
+            <a:pPr indent="-317500" lvl="1" marL="914400" rtl="0" algn="l">
+              <a:spcBef>
+                <a:spcPts val="0"/>
+              </a:spcBef>
+              <a:spcAft>
+                <a:spcPts val="0"/>
+              </a:spcAft>
+              <a:buSzPts val="1400"/>
+              <a:buAutoNum type="alphaLcPeriod"/>
+            </a:pPr>
+            <a:r>
+              <a:rPr lang="en"/>
+              <a:t>If horizontal and vertical margins are provided, they are used rather than the core utilization factor to determine coordinates (still aspect ratio is respected here)</a:t>
+            </a:r>
+            <a:endParaRPr/>
+          </a:p>
+          <a:p>
+            <a:pPr indent="0" lvl="0" marL="0" rtl="0" algn="l">
+              <a:spcBef>
+                <a:spcPts val="1600"/>
+              </a:spcBef>
+              <a:spcAft>
                 <a:spcPts val="1600"/>
               </a:spcAft>
               <a:buNone/>
@@ -8842,7 +9859,7 @@
       </p:sp>
       <p:pic>
         <p:nvPicPr>
-          <p:cNvPr id="154" name="Google Shape;154;p29"/>
+          <p:cNvPr id="153" name="Google Shape;153;p29"/>
           <p:cNvPicPr preferRelativeResize="0"/>
           <p:nvPr/>
         </p:nvPicPr>
@@ -8856,8 +9873,8 @@
         </p:blipFill>
         <p:spPr>
           <a:xfrm>
-            <a:off x="2107613" y="2105025"/>
-            <a:ext cx="2867025" cy="933450"/>
+            <a:off x="254000" y="3227150"/>
+            <a:ext cx="8743400" cy="1675050"/>
           </a:xfrm>
           <a:prstGeom prst="rect">
             <a:avLst/>
@@ -8881,7 +9898,7 @@
   <p:cSld>
     <p:spTree>
       <p:nvGrpSpPr>
-        <p:cNvPr id="158" name="Shape 158"/>
+        <p:cNvPr id="157" name="Shape 157"/>
         <p:cNvGrpSpPr/>
         <p:nvPr/>
       </p:nvGrpSpPr>
@@ -8895,7 +9912,7 @@
       </p:grpSpPr>
       <p:sp>
         <p:nvSpPr>
-          <p:cNvPr id="159" name="Google Shape;159;p30"/>
+          <p:cNvPr id="158" name="Google Shape;158;p30"/>
           <p:cNvSpPr txBox="1"/>
           <p:nvPr>
             <p:ph type="title"/>
@@ -8927,7 +9944,7 @@
             </a:pPr>
             <a:r>
               <a:rPr lang="en"/>
-              <a:t>Project Achievements:: Vias</a:t>
+              <a:t>Project Achievements:: Rows</a:t>
             </a:r>
             <a:endParaRPr/>
           </a:p>
@@ -8950,7 +9967,7 @@
       </p:sp>
       <p:sp>
         <p:nvSpPr>
-          <p:cNvPr id="160" name="Google Shape;160;p30"/>
+          <p:cNvPr id="159" name="Google Shape;159;p30"/>
           <p:cNvSpPr txBox="1"/>
           <p:nvPr>
             <p:ph idx="1" type="body"/>
@@ -8971,17 +9988,87 @@
           </a:bodyPr>
           <a:lstStyle/>
           <a:p>
-            <a:pPr indent="0" lvl="0" marL="0" rtl="0" algn="l">
-              <a:spcBef>
-                <a:spcPts val="0"/>
-              </a:spcBef>
-              <a:spcAft>
-                <a:spcPts val="1600"/>
-              </a:spcAft>
-              <a:buNone/>
-            </a:pPr>
-            <a:r>
-              <a:t/>
+            <a:pPr indent="-342900" lvl="0" marL="457200" rtl="0" algn="l">
+              <a:spcBef>
+                <a:spcPts val="0"/>
+              </a:spcBef>
+              <a:spcAft>
+                <a:spcPts val="0"/>
+              </a:spcAft>
+              <a:buSzPts val="1800"/>
+              <a:buAutoNum type="arabicPeriod"/>
+            </a:pPr>
+            <a:r>
+              <a:rPr lang="en"/>
+              <a:t>The number of rows is determined by the following:</a:t>
+            </a:r>
+            <a:endParaRPr/>
+          </a:p>
+          <a:p>
+            <a:pPr indent="-317500" lvl="1" marL="914400" rtl="0" algn="l">
+              <a:spcBef>
+                <a:spcPts val="0"/>
+              </a:spcBef>
+              <a:spcAft>
+                <a:spcPts val="0"/>
+              </a:spcAft>
+              <a:buSzPts val="1400"/>
+              <a:buAutoNum type="alphaLcPeriod"/>
+            </a:pPr>
+            <a:r>
+              <a:rPr lang="en"/>
+              <a:t>Each cells are grouped together in they have the same site type (e.g. core or corner)</a:t>
+            </a:r>
+            <a:endParaRPr/>
+          </a:p>
+          <a:p>
+            <a:pPr indent="-317500" lvl="1" marL="914400" rtl="0" algn="l">
+              <a:spcBef>
+                <a:spcPts val="0"/>
+              </a:spcBef>
+              <a:spcAft>
+                <a:spcPts val="0"/>
+              </a:spcAft>
+              <a:buSzPts val="1400"/>
+              <a:buAutoNum type="alphaLcPeriod"/>
+            </a:pPr>
+            <a:r>
+              <a:rPr lang="en"/>
+              <a:t>The heights of each group is all summed together</a:t>
+            </a:r>
+            <a:endParaRPr/>
+          </a:p>
+          <a:p>
+            <a:pPr indent="-317500" lvl="1" marL="914400" rtl="0" algn="l">
+              <a:spcBef>
+                <a:spcPts val="0"/>
+              </a:spcBef>
+              <a:spcAft>
+                <a:spcPts val="0"/>
+              </a:spcAft>
+              <a:buSzPts val="1400"/>
+              <a:buAutoNum type="alphaLcPeriod"/>
+            </a:pPr>
+            <a:r>
+              <a:rPr lang="en"/>
+              <a:t>The value we got in b is divided to the cell height of the same site type to determine the number of rows for each site type</a:t>
+            </a:r>
+            <a:endParaRPr/>
+          </a:p>
+          <a:p>
+            <a:pPr indent="-317500" lvl="1" marL="914400" rtl="0" algn="l">
+              <a:spcBef>
+                <a:spcPts val="0"/>
+              </a:spcBef>
+              <a:spcAft>
+                <a:spcPts val="0"/>
+              </a:spcAft>
+              <a:buSzPts val="1400"/>
+              <a:buAutoNum type="alphaLcPeriod"/>
+            </a:pPr>
+            <a:r>
+              <a:rPr lang="en"/>
+              <a:t>In the tested examples attached, all sites are just site core with cell height of 20 unit according to the LEF file. </a:t>
             </a:r>
             <a:endParaRPr/>
           </a:p>
@@ -8989,7 +10076,7 @@
       </p:sp>
       <p:pic>
         <p:nvPicPr>
-          <p:cNvPr id="161" name="Google Shape;161;p30"/>
+          <p:cNvPr id="160" name="Google Shape;160;p30"/>
           <p:cNvPicPr preferRelativeResize="0"/>
           <p:nvPr/>
         </p:nvPicPr>
@@ -9003,8 +10090,8 @@
         </p:blipFill>
         <p:spPr>
           <a:xfrm>
-            <a:off x="1958750" y="1591113"/>
-            <a:ext cx="4476750" cy="2657475"/>
+            <a:off x="2491038" y="3324275"/>
+            <a:ext cx="4161925" cy="409525"/>
           </a:xfrm>
           <a:prstGeom prst="rect">
             <a:avLst/>
@@ -9028,7 +10115,7 @@
   <p:cSld>
     <p:spTree>
       <p:nvGrpSpPr>
-        <p:cNvPr id="165" name="Shape 165"/>
+        <p:cNvPr id="164" name="Shape 164"/>
         <p:cNvGrpSpPr/>
         <p:nvPr/>
       </p:nvGrpSpPr>
@@ -9042,7 +10129,7 @@
       </p:grpSpPr>
       <p:sp>
         <p:nvSpPr>
-          <p:cNvPr id="166" name="Google Shape;166;p31"/>
+          <p:cNvPr id="165" name="Google Shape;165;p31"/>
           <p:cNvSpPr txBox="1"/>
           <p:nvPr>
             <p:ph type="title"/>
@@ -9050,7 +10137,7 @@
         </p:nvSpPr>
         <p:spPr>
           <a:xfrm>
-            <a:off x="311700" y="445025"/>
+            <a:off x="248200" y="152925"/>
             <a:ext cx="8520600" cy="572700"/>
           </a:xfrm>
           <a:prstGeom prst="rect">
@@ -9074,7 +10161,7 @@
             </a:pPr>
             <a:r>
               <a:rPr lang="en"/>
-              <a:t>Project Achievements:: Components</a:t>
+              <a:t>Project Achievements:: Tracks</a:t>
             </a:r>
             <a:endParaRPr/>
           </a:p>
@@ -9097,7 +10184,7 @@
       </p:sp>
       <p:sp>
         <p:nvSpPr>
-          <p:cNvPr id="167" name="Google Shape;167;p31"/>
+          <p:cNvPr id="166" name="Google Shape;166;p31"/>
           <p:cNvSpPr txBox="1"/>
           <p:nvPr>
             <p:ph idx="1" type="body"/>
@@ -9105,8 +10192,8 @@
         </p:nvSpPr>
         <p:spPr>
           <a:xfrm>
-            <a:off x="311700" y="1152475"/>
-            <a:ext cx="8520600" cy="3416400"/>
+            <a:off x="311700" y="796875"/>
+            <a:ext cx="8520600" cy="3990900"/>
           </a:xfrm>
           <a:prstGeom prst="rect">
             <a:avLst/>
@@ -9118,17 +10205,99 @@
           </a:bodyPr>
           <a:lstStyle/>
           <a:p>
-            <a:pPr indent="0" lvl="0" marL="0" rtl="0" algn="l">
-              <a:spcBef>
-                <a:spcPts val="0"/>
-              </a:spcBef>
-              <a:spcAft>
-                <a:spcPts val="1600"/>
-              </a:spcAft>
-              <a:buNone/>
-            </a:pPr>
-            <a:r>
-              <a:t/>
+            <a:pPr indent="-342900" lvl="0" marL="457200" rtl="0" algn="l">
+              <a:spcBef>
+                <a:spcPts val="0"/>
+              </a:spcBef>
+              <a:spcAft>
+                <a:spcPts val="0"/>
+              </a:spcAft>
+              <a:buSzPts val="1800"/>
+              <a:buAutoNum type="arabicPeriod"/>
+            </a:pPr>
+            <a:r>
+              <a:rPr lang="en"/>
+              <a:t>Each metal layer has tracks</a:t>
+            </a:r>
+            <a:endParaRPr/>
+          </a:p>
+          <a:p>
+            <a:pPr indent="-342900" lvl="0" marL="457200" rtl="0" algn="l">
+              <a:spcBef>
+                <a:spcPts val="0"/>
+              </a:spcBef>
+              <a:spcAft>
+                <a:spcPts val="0"/>
+              </a:spcAft>
+              <a:buSzPts val="1800"/>
+              <a:buAutoNum type="arabicPeriod"/>
+            </a:pPr>
+            <a:r>
+              <a:rPr lang="en"/>
+              <a:t>Orientation of tracks follows the orientation of their metal layers (i.e. Y if horizontal or X if vertical)</a:t>
+            </a:r>
+            <a:endParaRPr/>
+          </a:p>
+          <a:p>
+            <a:pPr indent="-342900" lvl="0" marL="457200" rtl="0" algn="l">
+              <a:spcBef>
+                <a:spcPts val="0"/>
+              </a:spcBef>
+              <a:spcAft>
+                <a:spcPts val="0"/>
+              </a:spcAft>
+              <a:buSzPts val="1800"/>
+              <a:buAutoNum type="arabicPeriod"/>
+            </a:pPr>
+            <a:r>
+              <a:rPr lang="en"/>
+              <a:t>The starting point of each track is assumed to be either the bottom x point of the die or the bottom y point of the die according to the orientation X or Y respectively.</a:t>
+            </a:r>
+            <a:endParaRPr/>
+          </a:p>
+          <a:p>
+            <a:pPr indent="-342900" lvl="0" marL="457200" rtl="0" algn="l">
+              <a:spcBef>
+                <a:spcPts val="0"/>
+              </a:spcBef>
+              <a:spcAft>
+                <a:spcPts val="0"/>
+              </a:spcAft>
+              <a:buSzPts val="1800"/>
+              <a:buAutoNum type="arabicPeriod"/>
+            </a:pPr>
+            <a:r>
+              <a:rPr lang="en"/>
+              <a:t>Each metal layer has a number of tracks according to the pitch </a:t>
+            </a:r>
+            <a:r>
+              <a:rPr lang="en"/>
+              <a:t>parameter</a:t>
+            </a:r>
+            <a:r>
+              <a:rPr lang="en"/>
+              <a:t> defined in lef file (the number of tracks= the total width of the die/ pitch of the layer) if the orientation is X(vertical) OR </a:t>
+            </a:r>
+            <a:r>
+              <a:rPr lang="en"/>
+              <a:t>(the number of tracks= the total height of the die/ pitch of the layer) if the orientation is Y(Horizontal); This number is typed after ‘DO’ in the format.</a:t>
+            </a:r>
+            <a:endParaRPr/>
+          </a:p>
+          <a:p>
+            <a:pPr indent="-342900" lvl="0" marL="457200" rtl="0" algn="l">
+              <a:spcBef>
+                <a:spcPts val="0"/>
+              </a:spcBef>
+              <a:spcAft>
+                <a:spcPts val="0"/>
+              </a:spcAft>
+              <a:buSzPts val="1800"/>
+              <a:buAutoNum type="arabicPeriod"/>
+            </a:pPr>
+            <a:r>
+              <a:rPr lang="en"/>
+              <a:t>The pitch parameter is the one after ‘STEP’ keyword in the output DEF file</a:t>
             </a:r>
             <a:endParaRPr/>
           </a:p>
@@ -9136,7 +10305,7 @@
       </p:sp>
       <p:pic>
         <p:nvPicPr>
-          <p:cNvPr id="168" name="Google Shape;168;p31"/>
+          <p:cNvPr id="167" name="Google Shape;167;p31"/>
           <p:cNvPicPr preferRelativeResize="0"/>
           <p:nvPr/>
         </p:nvPicPr>
@@ -9150,8 +10319,8 @@
         </p:blipFill>
         <p:spPr>
           <a:xfrm>
-            <a:off x="232363" y="1265225"/>
-            <a:ext cx="9134475" cy="3190875"/>
+            <a:off x="5317563" y="336550"/>
+            <a:ext cx="3514725" cy="742950"/>
           </a:xfrm>
           <a:prstGeom prst="rect">
             <a:avLst/>
@@ -9306,13 +10475,45 @@
                 <a:spcPts val="1600"/>
               </a:spcBef>
               <a:spcAft>
+                <a:spcPts val="0"/>
+              </a:spcAft>
+              <a:buNone/>
+            </a:pPr>
+            <a:r>
+              <a:rPr lang="en"/>
+              <a:t>2. DEF File Format</a:t>
+            </a:r>
+            <a:endParaRPr/>
+          </a:p>
+          <a:p>
+            <a:pPr indent="0" lvl="0" marL="0" rtl="0" algn="l">
+              <a:spcBef>
                 <a:spcPts val="1600"/>
-              </a:spcAft>
-              <a:buNone/>
-            </a:pPr>
-            <a:r>
-              <a:rPr lang="en"/>
-              <a:t>2.  Project Achievements</a:t>
+              </a:spcBef>
+              <a:spcAft>
+                <a:spcPts val="0"/>
+              </a:spcAft>
+              <a:buNone/>
+            </a:pPr>
+            <a:r>
+              <a:rPr lang="en"/>
+              <a:t>3. Project Achievements</a:t>
+            </a:r>
+            <a:endParaRPr/>
+          </a:p>
+          <a:p>
+            <a:pPr indent="0" lvl="0" marL="0" rtl="0" algn="l">
+              <a:spcBef>
+                <a:spcPts val="1600"/>
+              </a:spcBef>
+              <a:spcAft>
+                <a:spcPts val="1600"/>
+              </a:spcAft>
+              <a:buNone/>
+            </a:pPr>
+            <a:r>
+              <a:rPr lang="en"/>
+              <a:t>4. Testing the DEF file</a:t>
             </a:r>
             <a:endParaRPr/>
           </a:p>
@@ -9331,7 +10532,7 @@
   <p:cSld>
     <p:spTree>
       <p:nvGrpSpPr>
-        <p:cNvPr id="172" name="Shape 172"/>
+        <p:cNvPr id="171" name="Shape 171"/>
         <p:cNvGrpSpPr/>
         <p:nvPr/>
       </p:nvGrpSpPr>
@@ -9345,7 +10546,7 @@
       </p:grpSpPr>
       <p:sp>
         <p:nvSpPr>
-          <p:cNvPr id="173" name="Google Shape;173;p32"/>
+          <p:cNvPr id="172" name="Google Shape;172;p32"/>
           <p:cNvSpPr txBox="1"/>
           <p:nvPr>
             <p:ph type="title"/>
@@ -9377,7 +10578,7 @@
             </a:pPr>
             <a:r>
               <a:rPr lang="en"/>
-              <a:t>Project Achievements:: Pins</a:t>
+              <a:t>Project Achievements:: Vias</a:t>
             </a:r>
             <a:endParaRPr/>
           </a:p>
@@ -9400,7 +10601,7 @@
       </p:sp>
       <p:sp>
         <p:nvSpPr>
-          <p:cNvPr id="174" name="Google Shape;174;p32"/>
+          <p:cNvPr id="173" name="Google Shape;173;p32"/>
           <p:cNvSpPr txBox="1"/>
           <p:nvPr>
             <p:ph idx="1" type="body"/>
@@ -9409,7 +10610,7 @@
         <p:spPr>
           <a:xfrm>
             <a:off x="311700" y="1152475"/>
-            <a:ext cx="8520600" cy="3416400"/>
+            <a:ext cx="4043700" cy="3416400"/>
           </a:xfrm>
           <a:prstGeom prst="rect">
             <a:avLst/>
@@ -9421,17 +10622,36 @@
           </a:bodyPr>
           <a:lstStyle/>
           <a:p>
-            <a:pPr indent="0" lvl="0" marL="0" rtl="0" algn="l">
-              <a:spcBef>
-                <a:spcPts val="0"/>
-              </a:spcBef>
-              <a:spcAft>
-                <a:spcPts val="1600"/>
-              </a:spcAft>
-              <a:buNone/>
-            </a:pPr>
-            <a:r>
-              <a:t/>
+            <a:pPr indent="-342900" lvl="0" marL="457200" rtl="0" algn="l">
+              <a:spcBef>
+                <a:spcPts val="0"/>
+              </a:spcBef>
+              <a:spcAft>
+                <a:spcPts val="0"/>
+              </a:spcAft>
+              <a:buSzPts val="1800"/>
+              <a:buAutoNum type="arabicPeriod"/>
+            </a:pPr>
+            <a:r>
+              <a:rPr lang="en"/>
+              <a:t>The information for the entire section of VIAS is just extracted from  the LEF file with the same x,y coordinates that are also mentioned in the DEF file.</a:t>
+            </a:r>
+            <a:endParaRPr/>
+          </a:p>
+          <a:p>
+            <a:pPr indent="-342900" lvl="0" marL="457200" rtl="0" algn="l">
+              <a:spcBef>
+                <a:spcPts val="0"/>
+              </a:spcBef>
+              <a:spcAft>
+                <a:spcPts val="0"/>
+              </a:spcAft>
+              <a:buSzPts val="1800"/>
+              <a:buAutoNum type="arabicPeriod"/>
+            </a:pPr>
+            <a:r>
+              <a:rPr lang="en"/>
+              <a:t>Such section is optional to be included in the DEF file as its is just redundant to what is already provided in the LEF file.</a:t>
             </a:r>
             <a:endParaRPr/>
           </a:p>
@@ -9439,7 +10659,7 @@
       </p:sp>
       <p:pic>
         <p:nvPicPr>
-          <p:cNvPr id="175" name="Google Shape;175;p32"/>
+          <p:cNvPr id="174" name="Google Shape;174;p32"/>
           <p:cNvPicPr preferRelativeResize="0"/>
           <p:nvPr/>
         </p:nvPicPr>
@@ -9453,8 +10673,8 @@
         </p:blipFill>
         <p:spPr>
           <a:xfrm>
-            <a:off x="482974" y="1853575"/>
-            <a:ext cx="8349325" cy="2400300"/>
+            <a:off x="4444450" y="1438713"/>
+            <a:ext cx="4476750" cy="2657475"/>
           </a:xfrm>
           <a:prstGeom prst="rect">
             <a:avLst/>
@@ -9478,7 +10698,7 @@
   <p:cSld>
     <p:spTree>
       <p:nvGrpSpPr>
-        <p:cNvPr id="179" name="Shape 179"/>
+        <p:cNvPr id="178" name="Shape 178"/>
         <p:cNvGrpSpPr/>
         <p:nvPr/>
       </p:nvGrpSpPr>
@@ -9492,7 +10712,7 @@
       </p:grpSpPr>
       <p:sp>
         <p:nvSpPr>
-          <p:cNvPr id="180" name="Google Shape;180;p33"/>
+          <p:cNvPr id="179" name="Google Shape;179;p33"/>
           <p:cNvSpPr txBox="1"/>
           <p:nvPr>
             <p:ph type="title"/>
@@ -9524,7 +10744,7 @@
             </a:pPr>
             <a:r>
               <a:rPr lang="en"/>
-              <a:t>Project Achievements:: Nets</a:t>
+              <a:t>Project Achievements:: Components</a:t>
             </a:r>
             <a:endParaRPr/>
           </a:p>
@@ -9547,7 +10767,7 @@
       </p:sp>
       <p:sp>
         <p:nvSpPr>
-          <p:cNvPr id="181" name="Google Shape;181;p33"/>
+          <p:cNvPr id="180" name="Google Shape;180;p33"/>
           <p:cNvSpPr txBox="1"/>
           <p:nvPr>
             <p:ph idx="1" type="body"/>
@@ -9556,7 +10776,7 @@
         <p:spPr>
           <a:xfrm>
             <a:off x="311700" y="1152475"/>
-            <a:ext cx="8520600" cy="3416400"/>
+            <a:ext cx="6170100" cy="3416400"/>
           </a:xfrm>
           <a:prstGeom prst="rect">
             <a:avLst/>
@@ -9568,17 +10788,53 @@
           </a:bodyPr>
           <a:lstStyle/>
           <a:p>
-            <a:pPr indent="0" lvl="0" marL="0" rtl="0" algn="l">
-              <a:spcBef>
-                <a:spcPts val="0"/>
-              </a:spcBef>
-              <a:spcAft>
-                <a:spcPts val="1600"/>
-              </a:spcAft>
-              <a:buNone/>
-            </a:pPr>
-            <a:r>
-              <a:t/>
+            <a:pPr indent="-342900" lvl="0" marL="457200" rtl="0" algn="l">
+              <a:spcBef>
+                <a:spcPts val="0"/>
+              </a:spcBef>
+              <a:spcAft>
+                <a:spcPts val="0"/>
+              </a:spcAft>
+              <a:buSzPts val="1800"/>
+              <a:buAutoNum type="arabicPeriod"/>
+            </a:pPr>
+            <a:r>
+              <a:rPr lang="en"/>
+              <a:t>All the components are extracted from the GL Netlist provided by Yosys in json format.</a:t>
+            </a:r>
+            <a:endParaRPr/>
+          </a:p>
+          <a:p>
+            <a:pPr indent="-342900" lvl="0" marL="457200" rtl="0" algn="l">
+              <a:spcBef>
+                <a:spcPts val="0"/>
+              </a:spcBef>
+              <a:spcAft>
+                <a:spcPts val="0"/>
+              </a:spcAft>
+              <a:buSzPts val="1800"/>
+              <a:buAutoNum type="arabicPeriod"/>
+            </a:pPr>
+            <a:r>
+              <a:rPr lang="en"/>
+              <a:t>All components are mapped to ones from Standard Cell library which the user provides as input to the tool</a:t>
+            </a:r>
+            <a:endParaRPr/>
+          </a:p>
+          <a:p>
+            <a:pPr indent="-342900" lvl="0" marL="457200" rtl="0" algn="l">
+              <a:spcBef>
+                <a:spcPts val="0"/>
+              </a:spcBef>
+              <a:spcAft>
+                <a:spcPts val="0"/>
+              </a:spcAft>
+              <a:buSzPts val="1800"/>
+              <a:buAutoNum type="arabicPeriod"/>
+            </a:pPr>
+            <a:r>
+              <a:rPr lang="en"/>
+              <a:t>No placement information is provided here because the tool has no information about it.  </a:t>
             </a:r>
             <a:endParaRPr/>
           </a:p>
@@ -9586,7 +10842,7 @@
       </p:sp>
       <p:pic>
         <p:nvPicPr>
-          <p:cNvPr id="182" name="Google Shape;182;p33"/>
+          <p:cNvPr id="181" name="Google Shape;181;p33"/>
           <p:cNvPicPr preferRelativeResize="0"/>
           <p:nvPr/>
         </p:nvPicPr>
@@ -9600,8 +10856,1058 @@
         </p:blipFill>
         <p:spPr>
           <a:xfrm>
-            <a:off x="6292350" y="573025"/>
+            <a:off x="6481763" y="1289050"/>
+            <a:ext cx="2047875" cy="2971800"/>
+          </a:xfrm>
+          <a:prstGeom prst="rect">
+            <a:avLst/>
+          </a:prstGeom>
+          <a:noFill/>
+          <a:ln>
+            <a:noFill/>
+          </a:ln>
+        </p:spPr>
+      </p:pic>
+    </p:spTree>
+  </p:cSld>
+  <p:clrMapOvr>
+    <a:masterClrMapping/>
+  </p:clrMapOvr>
+</p:sld>
+</file>
+
+<file path=ppt/slides/slide22.xml><?xml version="1.0" encoding="utf-8"?>
+<p:sld xmlns:a="http://schemas.openxmlformats.org/drawingml/2006/main" xmlns:r="http://schemas.openxmlformats.org/officeDocument/2006/relationships" xmlns:mc="http://schemas.openxmlformats.org/markup-compatibility/2006" xmlns:mv="urn:schemas-microsoft-com:mac:vml" xmlns:p="http://schemas.openxmlformats.org/presentationml/2006/main" xmlns:c="http://schemas.openxmlformats.org/drawingml/2006/chart" xmlns:dgm="http://schemas.openxmlformats.org/drawingml/2006/diagram" xmlns:o="urn:schemas-microsoft-com:office:office" xmlns:v="urn:schemas-microsoft-com:vml" xmlns:pvml="urn:schemas-microsoft-com:office:powerpoint" xmlns:com="http://schemas.openxmlformats.org/drawingml/2006/compatibility" xmlns:p14="http://schemas.microsoft.com/office/powerpoint/2010/main" xmlns:p15="http://schemas.microsoft.com/office/powerpoint/2012/main">
+  <p:cSld>
+    <p:spTree>
+      <p:nvGrpSpPr>
+        <p:cNvPr id="185" name="Shape 185"/>
+        <p:cNvGrpSpPr/>
+        <p:nvPr/>
+      </p:nvGrpSpPr>
+      <p:grpSpPr>
+        <a:xfrm>
+          <a:off x="0" y="0"/>
+          <a:ext cx="0" cy="0"/>
+          <a:chOff x="0" y="0"/>
+          <a:chExt cx="0" cy="0"/>
+        </a:xfrm>
+      </p:grpSpPr>
+      <p:sp>
+        <p:nvSpPr>
+          <p:cNvPr id="186" name="Google Shape;186;p34"/>
+          <p:cNvSpPr txBox="1"/>
+          <p:nvPr>
+            <p:ph type="title"/>
+          </p:nvPr>
+        </p:nvSpPr>
+        <p:spPr>
+          <a:xfrm>
+            <a:off x="311700" y="445025"/>
+            <a:ext cx="8520600" cy="572700"/>
+          </a:xfrm>
+          <a:prstGeom prst="rect">
+            <a:avLst/>
+          </a:prstGeom>
+        </p:spPr>
+        <p:txBody>
+          <a:bodyPr anchorCtr="0" anchor="t" bIns="91425" lIns="91425" spcFirstLastPara="1" rIns="91425" wrap="square" tIns="91425">
+            <a:noAutofit/>
+          </a:bodyPr>
+          <a:lstStyle/>
+          <a:p>
+            <a:pPr indent="0" lvl="0" marL="0" rtl="0" algn="l">
+              <a:spcBef>
+                <a:spcPts val="0"/>
+              </a:spcBef>
+              <a:spcAft>
+                <a:spcPts val="0"/>
+              </a:spcAft>
+              <a:buNone/>
+            </a:pPr>
+            <a:r>
+              <a:rPr lang="en"/>
+              <a:t>Project Achievements:: Pins</a:t>
+            </a:r>
+            <a:endParaRPr/>
+          </a:p>
+          <a:p>
+            <a:pPr indent="0" lvl="0" marL="0" rtl="0" algn="l">
+              <a:spcBef>
+                <a:spcPts val="0"/>
+              </a:spcBef>
+              <a:spcAft>
+                <a:spcPts val="0"/>
+              </a:spcAft>
+              <a:buNone/>
+            </a:pPr>
+            <a:r>
+              <a:t/>
+            </a:r>
+            <a:endParaRPr/>
+          </a:p>
+        </p:txBody>
+      </p:sp>
+      <p:sp>
+        <p:nvSpPr>
+          <p:cNvPr id="187" name="Google Shape;187;p34"/>
+          <p:cNvSpPr txBox="1"/>
+          <p:nvPr>
+            <p:ph idx="1" type="body"/>
+          </p:nvPr>
+        </p:nvSpPr>
+        <p:spPr>
+          <a:xfrm>
+            <a:off x="311700" y="1152475"/>
+            <a:ext cx="3733200" cy="3416400"/>
+          </a:xfrm>
+          <a:prstGeom prst="rect">
+            <a:avLst/>
+          </a:prstGeom>
+        </p:spPr>
+        <p:txBody>
+          <a:bodyPr anchorCtr="0" anchor="t" bIns="91425" lIns="91425" spcFirstLastPara="1" rIns="91425" wrap="square" tIns="91425">
+            <a:noAutofit/>
+          </a:bodyPr>
+          <a:lstStyle/>
+          <a:p>
+            <a:pPr indent="-342900" lvl="0" marL="457200" rtl="0" algn="l">
+              <a:spcBef>
+                <a:spcPts val="0"/>
+              </a:spcBef>
+              <a:spcAft>
+                <a:spcPts val="0"/>
+              </a:spcAft>
+              <a:buSzPts val="1800"/>
+              <a:buAutoNum type="arabicPeriod"/>
+            </a:pPr>
+            <a:r>
+              <a:rPr lang="en"/>
+              <a:t>The pins section is also extracted from GL Netlist</a:t>
+            </a:r>
+            <a:endParaRPr/>
+          </a:p>
+          <a:p>
+            <a:pPr indent="-342900" lvl="0" marL="457200" rtl="0" algn="l">
+              <a:spcBef>
+                <a:spcPts val="0"/>
+              </a:spcBef>
+              <a:spcAft>
+                <a:spcPts val="0"/>
+              </a:spcAft>
+              <a:buSzPts val="1800"/>
+              <a:buAutoNum type="arabicPeriod"/>
+            </a:pPr>
+            <a:r>
+              <a:rPr lang="en"/>
+              <a:t>The section defines all the bits for each input or output port in the design</a:t>
+            </a:r>
+            <a:endParaRPr/>
+          </a:p>
+          <a:p>
+            <a:pPr indent="-342900" lvl="0" marL="457200" rtl="0" algn="l">
+              <a:spcBef>
+                <a:spcPts val="0"/>
+              </a:spcBef>
+              <a:spcAft>
+                <a:spcPts val="0"/>
+              </a:spcAft>
+              <a:buSzPts val="1800"/>
+              <a:buAutoNum type="arabicPeriod"/>
+            </a:pPr>
+            <a:r>
+              <a:rPr lang="en"/>
+              <a:t>Direction of each port is also defined as can be seen</a:t>
+            </a:r>
+            <a:endParaRPr/>
+          </a:p>
+          <a:p>
+            <a:pPr indent="-342900" lvl="0" marL="457200" rtl="0" algn="l">
+              <a:spcBef>
+                <a:spcPts val="0"/>
+              </a:spcBef>
+              <a:spcAft>
+                <a:spcPts val="0"/>
+              </a:spcAft>
+              <a:buSzPts val="1800"/>
+              <a:buAutoNum type="arabicPeriod"/>
+            </a:pPr>
+            <a:r>
+              <a:rPr lang="en"/>
+              <a:t>No placement information is provided here because the tool has no information about it.  </a:t>
+            </a:r>
+            <a:endParaRPr/>
+          </a:p>
+        </p:txBody>
+      </p:sp>
+      <p:pic>
+        <p:nvPicPr>
+          <p:cNvPr id="188" name="Google Shape;188;p34"/>
+          <p:cNvPicPr preferRelativeResize="0"/>
+          <p:nvPr/>
+        </p:nvPicPr>
+        <p:blipFill>
+          <a:blip r:embed="rId3">
+            <a:alphaModFix/>
+          </a:blip>
+          <a:stretch>
+            <a:fillRect/>
+          </a:stretch>
+        </p:blipFill>
+        <p:spPr>
+          <a:xfrm>
+            <a:off x="4044950" y="1571625"/>
+            <a:ext cx="4914900" cy="2457450"/>
+          </a:xfrm>
+          <a:prstGeom prst="rect">
+            <a:avLst/>
+          </a:prstGeom>
+          <a:noFill/>
+          <a:ln>
+            <a:noFill/>
+          </a:ln>
+        </p:spPr>
+      </p:pic>
+    </p:spTree>
+  </p:cSld>
+  <p:clrMapOvr>
+    <a:masterClrMapping/>
+  </p:clrMapOvr>
+</p:sld>
+</file>
+
+<file path=ppt/slides/slide23.xml><?xml version="1.0" encoding="utf-8"?>
+<p:sld xmlns:a="http://schemas.openxmlformats.org/drawingml/2006/main" xmlns:r="http://schemas.openxmlformats.org/officeDocument/2006/relationships" xmlns:mc="http://schemas.openxmlformats.org/markup-compatibility/2006" xmlns:mv="urn:schemas-microsoft-com:mac:vml" xmlns:p="http://schemas.openxmlformats.org/presentationml/2006/main" xmlns:c="http://schemas.openxmlformats.org/drawingml/2006/chart" xmlns:dgm="http://schemas.openxmlformats.org/drawingml/2006/diagram" xmlns:o="urn:schemas-microsoft-com:office:office" xmlns:v="urn:schemas-microsoft-com:vml" xmlns:pvml="urn:schemas-microsoft-com:office:powerpoint" xmlns:com="http://schemas.openxmlformats.org/drawingml/2006/compatibility" xmlns:p14="http://schemas.microsoft.com/office/powerpoint/2010/main" xmlns:p15="http://schemas.microsoft.com/office/powerpoint/2012/main">
+  <p:cSld>
+    <p:spTree>
+      <p:nvGrpSpPr>
+        <p:cNvPr id="192" name="Shape 192"/>
+        <p:cNvGrpSpPr/>
+        <p:nvPr/>
+      </p:nvGrpSpPr>
+      <p:grpSpPr>
+        <a:xfrm>
+          <a:off x="0" y="0"/>
+          <a:ext cx="0" cy="0"/>
+          <a:chOff x="0" y="0"/>
+          <a:chExt cx="0" cy="0"/>
+        </a:xfrm>
+      </p:grpSpPr>
+      <p:sp>
+        <p:nvSpPr>
+          <p:cNvPr id="193" name="Google Shape;193;p35"/>
+          <p:cNvSpPr txBox="1"/>
+          <p:nvPr>
+            <p:ph type="title"/>
+          </p:nvPr>
+        </p:nvSpPr>
+        <p:spPr>
+          <a:xfrm>
+            <a:off x="311700" y="445025"/>
+            <a:ext cx="8520600" cy="572700"/>
+          </a:xfrm>
+          <a:prstGeom prst="rect">
+            <a:avLst/>
+          </a:prstGeom>
+        </p:spPr>
+        <p:txBody>
+          <a:bodyPr anchorCtr="0" anchor="t" bIns="91425" lIns="91425" spcFirstLastPara="1" rIns="91425" wrap="square" tIns="91425">
+            <a:noAutofit/>
+          </a:bodyPr>
+          <a:lstStyle/>
+          <a:p>
+            <a:pPr indent="0" lvl="0" marL="0" rtl="0" algn="l">
+              <a:spcBef>
+                <a:spcPts val="0"/>
+              </a:spcBef>
+              <a:spcAft>
+                <a:spcPts val="0"/>
+              </a:spcAft>
+              <a:buNone/>
+            </a:pPr>
+            <a:r>
+              <a:rPr lang="en"/>
+              <a:t>Project Achievements:: SpecialNets</a:t>
+            </a:r>
+            <a:endParaRPr/>
+          </a:p>
+          <a:p>
+            <a:pPr indent="0" lvl="0" marL="0" rtl="0" algn="l">
+              <a:spcBef>
+                <a:spcPts val="0"/>
+              </a:spcBef>
+              <a:spcAft>
+                <a:spcPts val="0"/>
+              </a:spcAft>
+              <a:buNone/>
+            </a:pPr>
+            <a:r>
+              <a:t/>
+            </a:r>
+            <a:endParaRPr/>
+          </a:p>
+        </p:txBody>
+      </p:sp>
+      <p:sp>
+        <p:nvSpPr>
+          <p:cNvPr id="194" name="Google Shape;194;p35"/>
+          <p:cNvSpPr txBox="1"/>
+          <p:nvPr>
+            <p:ph idx="1" type="body"/>
+          </p:nvPr>
+        </p:nvSpPr>
+        <p:spPr>
+          <a:xfrm>
+            <a:off x="311700" y="1152475"/>
+            <a:ext cx="4488900" cy="3416400"/>
+          </a:xfrm>
+          <a:prstGeom prst="rect">
+            <a:avLst/>
+          </a:prstGeom>
+        </p:spPr>
+        <p:txBody>
+          <a:bodyPr anchorCtr="0" anchor="t" bIns="91425" lIns="91425" spcFirstLastPara="1" rIns="91425" wrap="square" tIns="91425">
+            <a:noAutofit/>
+          </a:bodyPr>
+          <a:lstStyle/>
+          <a:p>
+            <a:pPr indent="-342900" lvl="0" marL="457200" rtl="0" algn="l">
+              <a:spcBef>
+                <a:spcPts val="0"/>
+              </a:spcBef>
+              <a:spcAft>
+                <a:spcPts val="0"/>
+              </a:spcAft>
+              <a:buSzPts val="1800"/>
+              <a:buAutoNum type="arabicPeriod"/>
+            </a:pPr>
+            <a:r>
+              <a:rPr lang="en"/>
+              <a:t>The tool always assumes that both gnd and vdd signals are special nets because this could be helpful for routing in next steps of the design flow</a:t>
+            </a:r>
+            <a:endParaRPr/>
+          </a:p>
+          <a:p>
+            <a:pPr indent="-342900" lvl="0" marL="457200" rtl="0" algn="l">
+              <a:spcBef>
+                <a:spcPts val="0"/>
+              </a:spcBef>
+              <a:spcAft>
+                <a:spcPts val="0"/>
+              </a:spcAft>
+              <a:buSzPts val="1800"/>
+              <a:buAutoNum type="arabicPeriod"/>
+            </a:pPr>
+            <a:r>
+              <a:rPr lang="en"/>
+              <a:t>Information about the metal layer of each special net and the ring width is provided by the user and added to this section.</a:t>
+            </a:r>
+            <a:endParaRPr/>
+          </a:p>
+        </p:txBody>
+      </p:sp>
+      <p:pic>
+        <p:nvPicPr>
+          <p:cNvPr id="195" name="Google Shape;195;p35"/>
+          <p:cNvPicPr preferRelativeResize="0"/>
+          <p:nvPr/>
+        </p:nvPicPr>
+        <p:blipFill>
+          <a:blip r:embed="rId3">
+            <a:alphaModFix/>
+          </a:blip>
+          <a:stretch>
+            <a:fillRect/>
+          </a:stretch>
+        </p:blipFill>
+        <p:spPr>
+          <a:xfrm>
+            <a:off x="6159500" y="1843225"/>
+            <a:ext cx="1876425" cy="1085850"/>
+          </a:xfrm>
+          <a:prstGeom prst="rect">
+            <a:avLst/>
+          </a:prstGeom>
+          <a:noFill/>
+          <a:ln>
+            <a:noFill/>
+          </a:ln>
+        </p:spPr>
+      </p:pic>
+    </p:spTree>
+  </p:cSld>
+  <p:clrMapOvr>
+    <a:masterClrMapping/>
+  </p:clrMapOvr>
+</p:sld>
+</file>
+
+<file path=ppt/slides/slide24.xml><?xml version="1.0" encoding="utf-8"?>
+<p:sld xmlns:a="http://schemas.openxmlformats.org/drawingml/2006/main" xmlns:r="http://schemas.openxmlformats.org/officeDocument/2006/relationships" xmlns:mc="http://schemas.openxmlformats.org/markup-compatibility/2006" xmlns:mv="urn:schemas-microsoft-com:mac:vml" xmlns:p="http://schemas.openxmlformats.org/presentationml/2006/main" xmlns:c="http://schemas.openxmlformats.org/drawingml/2006/chart" xmlns:dgm="http://schemas.openxmlformats.org/drawingml/2006/diagram" xmlns:o="urn:schemas-microsoft-com:office:office" xmlns:v="urn:schemas-microsoft-com:vml" xmlns:pvml="urn:schemas-microsoft-com:office:powerpoint" xmlns:com="http://schemas.openxmlformats.org/drawingml/2006/compatibility" xmlns:p14="http://schemas.microsoft.com/office/powerpoint/2010/main" xmlns:p15="http://schemas.microsoft.com/office/powerpoint/2012/main">
+  <p:cSld>
+    <p:spTree>
+      <p:nvGrpSpPr>
+        <p:cNvPr id="199" name="Shape 199"/>
+        <p:cNvGrpSpPr/>
+        <p:nvPr/>
+      </p:nvGrpSpPr>
+      <p:grpSpPr>
+        <a:xfrm>
+          <a:off x="0" y="0"/>
+          <a:ext cx="0" cy="0"/>
+          <a:chOff x="0" y="0"/>
+          <a:chExt cx="0" cy="0"/>
+        </a:xfrm>
+      </p:grpSpPr>
+      <p:sp>
+        <p:nvSpPr>
+          <p:cNvPr id="200" name="Google Shape;200;p36"/>
+          <p:cNvSpPr txBox="1"/>
+          <p:nvPr>
+            <p:ph type="title"/>
+          </p:nvPr>
+        </p:nvSpPr>
+        <p:spPr>
+          <a:xfrm>
+            <a:off x="311700" y="445025"/>
+            <a:ext cx="8520600" cy="572700"/>
+          </a:xfrm>
+          <a:prstGeom prst="rect">
+            <a:avLst/>
+          </a:prstGeom>
+        </p:spPr>
+        <p:txBody>
+          <a:bodyPr anchorCtr="0" anchor="t" bIns="91425" lIns="91425" spcFirstLastPara="1" rIns="91425" wrap="square" tIns="91425">
+            <a:noAutofit/>
+          </a:bodyPr>
+          <a:lstStyle/>
+          <a:p>
+            <a:pPr indent="0" lvl="0" marL="0" rtl="0" algn="l">
+              <a:spcBef>
+                <a:spcPts val="0"/>
+              </a:spcBef>
+              <a:spcAft>
+                <a:spcPts val="0"/>
+              </a:spcAft>
+              <a:buNone/>
+            </a:pPr>
+            <a:r>
+              <a:rPr lang="en"/>
+              <a:t>Project Achievements:: Nets</a:t>
+            </a:r>
+            <a:endParaRPr/>
+          </a:p>
+          <a:p>
+            <a:pPr indent="0" lvl="0" marL="0" rtl="0" algn="l">
+              <a:spcBef>
+                <a:spcPts val="0"/>
+              </a:spcBef>
+              <a:spcAft>
+                <a:spcPts val="0"/>
+              </a:spcAft>
+              <a:buNone/>
+            </a:pPr>
+            <a:r>
+              <a:t/>
+            </a:r>
+            <a:endParaRPr/>
+          </a:p>
+        </p:txBody>
+      </p:sp>
+      <p:sp>
+        <p:nvSpPr>
+          <p:cNvPr id="201" name="Google Shape;201;p36"/>
+          <p:cNvSpPr txBox="1"/>
+          <p:nvPr>
+            <p:ph idx="1" type="body"/>
+          </p:nvPr>
+        </p:nvSpPr>
+        <p:spPr>
+          <a:xfrm>
+            <a:off x="311700" y="1152475"/>
+            <a:ext cx="5466900" cy="3416400"/>
+          </a:xfrm>
+          <a:prstGeom prst="rect">
+            <a:avLst/>
+          </a:prstGeom>
+        </p:spPr>
+        <p:txBody>
+          <a:bodyPr anchorCtr="0" anchor="t" bIns="91425" lIns="91425" spcFirstLastPara="1" rIns="91425" wrap="square" tIns="91425">
+            <a:noAutofit/>
+          </a:bodyPr>
+          <a:lstStyle/>
+          <a:p>
+            <a:pPr indent="-342900" lvl="0" marL="457200" rtl="0" algn="l">
+              <a:spcBef>
+                <a:spcPts val="0"/>
+              </a:spcBef>
+              <a:spcAft>
+                <a:spcPts val="0"/>
+              </a:spcAft>
+              <a:buSzPts val="1800"/>
+              <a:buAutoNum type="arabicPeriod"/>
+            </a:pPr>
+            <a:r>
+              <a:rPr lang="en"/>
+              <a:t>This section provides information about each net in the design (internal or external ones) with all the cells </a:t>
+            </a:r>
+            <a:r>
+              <a:rPr lang="en"/>
+              <a:t>connected</a:t>
+            </a:r>
+            <a:r>
+              <a:rPr lang="en"/>
+              <a:t> to it. Such information is extracted from </a:t>
+            </a:r>
+            <a:r>
+              <a:rPr lang="en"/>
+              <a:t>GL Netlist.</a:t>
+            </a:r>
+            <a:endParaRPr/>
+          </a:p>
+          <a:p>
+            <a:pPr indent="-342900" lvl="0" marL="457200" rtl="0" algn="l">
+              <a:spcBef>
+                <a:spcPts val="0"/>
+              </a:spcBef>
+              <a:spcAft>
+                <a:spcPts val="0"/>
+              </a:spcAft>
+              <a:buSzPts val="1800"/>
+              <a:buAutoNum type="arabicPeriod"/>
+            </a:pPr>
+            <a:r>
+              <a:rPr lang="en"/>
+              <a:t>If the net is external (actually a port) then the net is connected to a pin of the same name and also to a cell (e.g. look at the a signal in this figure)</a:t>
+            </a:r>
+            <a:endParaRPr/>
+          </a:p>
+        </p:txBody>
+      </p:sp>
+      <p:pic>
+        <p:nvPicPr>
+          <p:cNvPr id="202" name="Google Shape;202;p36"/>
+          <p:cNvPicPr preferRelativeResize="0"/>
+          <p:nvPr/>
+        </p:nvPicPr>
+        <p:blipFill>
+          <a:blip r:embed="rId3">
+            <a:alphaModFix/>
+          </a:blip>
+          <a:stretch>
+            <a:fillRect/>
+          </a:stretch>
+        </p:blipFill>
+        <p:spPr>
+          <a:xfrm>
+            <a:off x="6838450" y="758875"/>
             <a:ext cx="1738300" cy="3810000"/>
+          </a:xfrm>
+          <a:prstGeom prst="rect">
+            <a:avLst/>
+          </a:prstGeom>
+          <a:noFill/>
+          <a:ln>
+            <a:noFill/>
+          </a:ln>
+        </p:spPr>
+      </p:pic>
+    </p:spTree>
+  </p:cSld>
+  <p:clrMapOvr>
+    <a:masterClrMapping/>
+  </p:clrMapOvr>
+</p:sld>
+</file>
+
+<file path=ppt/slides/slide25.xml><?xml version="1.0" encoding="utf-8"?>
+<p:sld xmlns:a="http://schemas.openxmlformats.org/drawingml/2006/main" xmlns:r="http://schemas.openxmlformats.org/officeDocument/2006/relationships" xmlns:mc="http://schemas.openxmlformats.org/markup-compatibility/2006" xmlns:mv="urn:schemas-microsoft-com:mac:vml" xmlns:p="http://schemas.openxmlformats.org/presentationml/2006/main" xmlns:c="http://schemas.openxmlformats.org/drawingml/2006/chart" xmlns:dgm="http://schemas.openxmlformats.org/drawingml/2006/diagram" xmlns:o="urn:schemas-microsoft-com:office:office" xmlns:v="urn:schemas-microsoft-com:vml" xmlns:pvml="urn:schemas-microsoft-com:office:powerpoint" xmlns:com="http://schemas.openxmlformats.org/drawingml/2006/compatibility" xmlns:p14="http://schemas.microsoft.com/office/powerpoint/2010/main" xmlns:p15="http://schemas.microsoft.com/office/powerpoint/2012/main">
+  <p:cSld>
+    <p:spTree>
+      <p:nvGrpSpPr>
+        <p:cNvPr id="206" name="Shape 206"/>
+        <p:cNvGrpSpPr/>
+        <p:nvPr/>
+      </p:nvGrpSpPr>
+      <p:grpSpPr>
+        <a:xfrm>
+          <a:off x="0" y="0"/>
+          <a:ext cx="0" cy="0"/>
+          <a:chOff x="0" y="0"/>
+          <a:chExt cx="0" cy="0"/>
+        </a:xfrm>
+      </p:grpSpPr>
+      <p:sp>
+        <p:nvSpPr>
+          <p:cNvPr id="207" name="Google Shape;207;p37"/>
+          <p:cNvSpPr txBox="1"/>
+          <p:nvPr>
+            <p:ph type="title"/>
+          </p:nvPr>
+        </p:nvSpPr>
+        <p:spPr>
+          <a:xfrm>
+            <a:off x="311700" y="445025"/>
+            <a:ext cx="8520600" cy="572700"/>
+          </a:xfrm>
+          <a:prstGeom prst="rect">
+            <a:avLst/>
+          </a:prstGeom>
+        </p:spPr>
+        <p:txBody>
+          <a:bodyPr anchorCtr="0" anchor="t" bIns="91425" lIns="91425" spcFirstLastPara="1" rIns="91425" wrap="square" tIns="91425">
+            <a:noAutofit/>
+          </a:bodyPr>
+          <a:lstStyle/>
+          <a:p>
+            <a:pPr indent="0" lvl="0" marL="0" rtl="0" algn="l">
+              <a:spcBef>
+                <a:spcPts val="0"/>
+              </a:spcBef>
+              <a:spcAft>
+                <a:spcPts val="0"/>
+              </a:spcAft>
+              <a:buNone/>
+            </a:pPr>
+            <a:r>
+              <a:rPr lang="en"/>
+              <a:t>Testing the DEF file</a:t>
+            </a:r>
+            <a:endParaRPr/>
+          </a:p>
+        </p:txBody>
+      </p:sp>
+      <p:sp>
+        <p:nvSpPr>
+          <p:cNvPr id="208" name="Google Shape;208;p37"/>
+          <p:cNvSpPr txBox="1"/>
+          <p:nvPr>
+            <p:ph idx="1" type="body"/>
+          </p:nvPr>
+        </p:nvSpPr>
+        <p:spPr>
+          <a:xfrm>
+            <a:off x="311700" y="1152475"/>
+            <a:ext cx="8520600" cy="3416400"/>
+          </a:xfrm>
+          <a:prstGeom prst="rect">
+            <a:avLst/>
+          </a:prstGeom>
+        </p:spPr>
+        <p:txBody>
+          <a:bodyPr anchorCtr="0" anchor="t" bIns="91425" lIns="91425" spcFirstLastPara="1" rIns="91425" wrap="square" tIns="91425">
+            <a:noAutofit/>
+          </a:bodyPr>
+          <a:lstStyle/>
+          <a:p>
+            <a:pPr indent="-342900" lvl="0" marL="457200" rtl="0" algn="l">
+              <a:spcBef>
+                <a:spcPts val="0"/>
+              </a:spcBef>
+              <a:spcAft>
+                <a:spcPts val="0"/>
+              </a:spcAft>
+              <a:buSzPts val="1800"/>
+              <a:buAutoNum type="arabicPeriod"/>
+            </a:pPr>
+            <a:r>
+              <a:rPr lang="en"/>
+              <a:t>Tested on four designs mux4x1, uart, half_adder, and round_robin_arbiter (can be found in tests </a:t>
+            </a:r>
+            <a:r>
+              <a:rPr lang="en"/>
+              <a:t>directory</a:t>
+            </a:r>
+            <a:r>
+              <a:rPr lang="en"/>
+              <a:t>).</a:t>
+            </a:r>
+            <a:endParaRPr/>
+          </a:p>
+          <a:p>
+            <a:pPr indent="-342900" lvl="0" marL="457200" rtl="0" algn="l">
+              <a:spcBef>
+                <a:spcPts val="0"/>
+              </a:spcBef>
+              <a:spcAft>
+                <a:spcPts val="0"/>
+              </a:spcAft>
+              <a:buSzPts val="1800"/>
+              <a:buAutoNum type="arabicPeriod"/>
+            </a:pPr>
+            <a:r>
+              <a:rPr lang="en"/>
+              <a:t> The output def file was read correctly and verified using Glade IC Layout Tool. The following slides show the image of layout provided by Glade for each cell.</a:t>
+            </a:r>
+            <a:endParaRPr/>
+          </a:p>
+        </p:txBody>
+      </p:sp>
+    </p:spTree>
+  </p:cSld>
+  <p:clrMapOvr>
+    <a:masterClrMapping/>
+  </p:clrMapOvr>
+</p:sld>
+</file>
+
+<file path=ppt/slides/slide26.xml><?xml version="1.0" encoding="utf-8"?>
+<p:sld xmlns:a="http://schemas.openxmlformats.org/drawingml/2006/main" xmlns:r="http://schemas.openxmlformats.org/officeDocument/2006/relationships" xmlns:mc="http://schemas.openxmlformats.org/markup-compatibility/2006" xmlns:mv="urn:schemas-microsoft-com:mac:vml" xmlns:p="http://schemas.openxmlformats.org/presentationml/2006/main" xmlns:c="http://schemas.openxmlformats.org/drawingml/2006/chart" xmlns:dgm="http://schemas.openxmlformats.org/drawingml/2006/diagram" xmlns:o="urn:schemas-microsoft-com:office:office" xmlns:v="urn:schemas-microsoft-com:vml" xmlns:pvml="urn:schemas-microsoft-com:office:powerpoint" xmlns:com="http://schemas.openxmlformats.org/drawingml/2006/compatibility" xmlns:p14="http://schemas.microsoft.com/office/powerpoint/2010/main" xmlns:p15="http://schemas.microsoft.com/office/powerpoint/2012/main">
+  <p:cSld>
+    <p:spTree>
+      <p:nvGrpSpPr>
+        <p:cNvPr id="212" name="Shape 212"/>
+        <p:cNvGrpSpPr/>
+        <p:nvPr/>
+      </p:nvGrpSpPr>
+      <p:grpSpPr>
+        <a:xfrm>
+          <a:off x="0" y="0"/>
+          <a:ext cx="0" cy="0"/>
+          <a:chOff x="0" y="0"/>
+          <a:chExt cx="0" cy="0"/>
+        </a:xfrm>
+      </p:grpSpPr>
+      <p:sp>
+        <p:nvSpPr>
+          <p:cNvPr id="213" name="Google Shape;213;p38"/>
+          <p:cNvSpPr txBox="1"/>
+          <p:nvPr>
+            <p:ph type="title"/>
+          </p:nvPr>
+        </p:nvSpPr>
+        <p:spPr>
+          <a:xfrm>
+            <a:off x="311700" y="445025"/>
+            <a:ext cx="8520600" cy="572700"/>
+          </a:xfrm>
+          <a:prstGeom prst="rect">
+            <a:avLst/>
+          </a:prstGeom>
+        </p:spPr>
+        <p:txBody>
+          <a:bodyPr anchorCtr="0" anchor="t" bIns="91425" lIns="91425" spcFirstLastPara="1" rIns="91425" wrap="square" tIns="91425">
+            <a:noAutofit/>
+          </a:bodyPr>
+          <a:lstStyle/>
+          <a:p>
+            <a:pPr indent="0" lvl="0" marL="0" rtl="0" algn="l">
+              <a:lnSpc>
+                <a:spcPct val="115000"/>
+              </a:lnSpc>
+              <a:spcBef>
+                <a:spcPts val="0"/>
+              </a:spcBef>
+              <a:spcAft>
+                <a:spcPts val="1600"/>
+              </a:spcAft>
+              <a:buNone/>
+            </a:pPr>
+            <a:r>
+              <a:rPr lang="en"/>
+              <a:t>MUX4x1 Layout</a:t>
+            </a:r>
+            <a:endParaRPr/>
+          </a:p>
+        </p:txBody>
+      </p:sp>
+      <p:pic>
+        <p:nvPicPr>
+          <p:cNvPr id="214" name="Google Shape;214;p38"/>
+          <p:cNvPicPr preferRelativeResize="0"/>
+          <p:nvPr/>
+        </p:nvPicPr>
+        <p:blipFill>
+          <a:blip r:embed="rId3">
+            <a:alphaModFix/>
+          </a:blip>
+          <a:stretch>
+            <a:fillRect/>
+          </a:stretch>
+        </p:blipFill>
+        <p:spPr>
+          <a:xfrm>
+            <a:off x="1760538" y="1265238"/>
+            <a:ext cx="5953125" cy="3552825"/>
+          </a:xfrm>
+          <a:prstGeom prst="rect">
+            <a:avLst/>
+          </a:prstGeom>
+          <a:noFill/>
+          <a:ln>
+            <a:noFill/>
+          </a:ln>
+        </p:spPr>
+      </p:pic>
+    </p:spTree>
+  </p:cSld>
+  <p:clrMapOvr>
+    <a:masterClrMapping/>
+  </p:clrMapOvr>
+</p:sld>
+</file>
+
+<file path=ppt/slides/slide27.xml><?xml version="1.0" encoding="utf-8"?>
+<p:sld xmlns:a="http://schemas.openxmlformats.org/drawingml/2006/main" xmlns:r="http://schemas.openxmlformats.org/officeDocument/2006/relationships" xmlns:mc="http://schemas.openxmlformats.org/markup-compatibility/2006" xmlns:mv="urn:schemas-microsoft-com:mac:vml" xmlns:p="http://schemas.openxmlformats.org/presentationml/2006/main" xmlns:c="http://schemas.openxmlformats.org/drawingml/2006/chart" xmlns:dgm="http://schemas.openxmlformats.org/drawingml/2006/diagram" xmlns:o="urn:schemas-microsoft-com:office:office" xmlns:v="urn:schemas-microsoft-com:vml" xmlns:pvml="urn:schemas-microsoft-com:office:powerpoint" xmlns:com="http://schemas.openxmlformats.org/drawingml/2006/compatibility" xmlns:p14="http://schemas.microsoft.com/office/powerpoint/2010/main" xmlns:p15="http://schemas.microsoft.com/office/powerpoint/2012/main">
+  <p:cSld>
+    <p:spTree>
+      <p:nvGrpSpPr>
+        <p:cNvPr id="218" name="Shape 218"/>
+        <p:cNvGrpSpPr/>
+        <p:nvPr/>
+      </p:nvGrpSpPr>
+      <p:grpSpPr>
+        <a:xfrm>
+          <a:off x="0" y="0"/>
+          <a:ext cx="0" cy="0"/>
+          <a:chOff x="0" y="0"/>
+          <a:chExt cx="0" cy="0"/>
+        </a:xfrm>
+      </p:grpSpPr>
+      <p:sp>
+        <p:nvSpPr>
+          <p:cNvPr id="219" name="Google Shape;219;p39"/>
+          <p:cNvSpPr txBox="1"/>
+          <p:nvPr>
+            <p:ph type="title"/>
+          </p:nvPr>
+        </p:nvSpPr>
+        <p:spPr>
+          <a:xfrm>
+            <a:off x="311700" y="445025"/>
+            <a:ext cx="8520600" cy="572700"/>
+          </a:xfrm>
+          <a:prstGeom prst="rect">
+            <a:avLst/>
+          </a:prstGeom>
+        </p:spPr>
+        <p:txBody>
+          <a:bodyPr anchorCtr="0" anchor="t" bIns="91425" lIns="91425" spcFirstLastPara="1" rIns="91425" wrap="square" tIns="91425">
+            <a:noAutofit/>
+          </a:bodyPr>
+          <a:lstStyle/>
+          <a:p>
+            <a:pPr indent="0" lvl="0" marL="0" rtl="0" algn="l">
+              <a:spcBef>
+                <a:spcPts val="0"/>
+              </a:spcBef>
+              <a:spcAft>
+                <a:spcPts val="0"/>
+              </a:spcAft>
+              <a:buNone/>
+            </a:pPr>
+            <a:r>
+              <a:rPr lang="en"/>
+              <a:t>UART Layout</a:t>
+            </a:r>
+            <a:endParaRPr/>
+          </a:p>
+        </p:txBody>
+      </p:sp>
+      <p:pic>
+        <p:nvPicPr>
+          <p:cNvPr id="220" name="Google Shape;220;p39"/>
+          <p:cNvPicPr preferRelativeResize="0"/>
+          <p:nvPr/>
+        </p:nvPicPr>
+        <p:blipFill>
+          <a:blip r:embed="rId3">
+            <a:alphaModFix/>
+          </a:blip>
+          <a:stretch>
+            <a:fillRect/>
+          </a:stretch>
+        </p:blipFill>
+        <p:spPr>
+          <a:xfrm>
+            <a:off x="1595438" y="1144725"/>
+            <a:ext cx="5953125" cy="3552825"/>
+          </a:xfrm>
+          <a:prstGeom prst="rect">
+            <a:avLst/>
+          </a:prstGeom>
+          <a:noFill/>
+          <a:ln>
+            <a:noFill/>
+          </a:ln>
+        </p:spPr>
+      </p:pic>
+    </p:spTree>
+  </p:cSld>
+  <p:clrMapOvr>
+    <a:masterClrMapping/>
+  </p:clrMapOvr>
+</p:sld>
+</file>
+
+<file path=ppt/slides/slide28.xml><?xml version="1.0" encoding="utf-8"?>
+<p:sld xmlns:a="http://schemas.openxmlformats.org/drawingml/2006/main" xmlns:r="http://schemas.openxmlformats.org/officeDocument/2006/relationships" xmlns:mc="http://schemas.openxmlformats.org/markup-compatibility/2006" xmlns:mv="urn:schemas-microsoft-com:mac:vml" xmlns:p="http://schemas.openxmlformats.org/presentationml/2006/main" xmlns:c="http://schemas.openxmlformats.org/drawingml/2006/chart" xmlns:dgm="http://schemas.openxmlformats.org/drawingml/2006/diagram" xmlns:o="urn:schemas-microsoft-com:office:office" xmlns:v="urn:schemas-microsoft-com:vml" xmlns:pvml="urn:schemas-microsoft-com:office:powerpoint" xmlns:com="http://schemas.openxmlformats.org/drawingml/2006/compatibility" xmlns:p14="http://schemas.microsoft.com/office/powerpoint/2010/main" xmlns:p15="http://schemas.microsoft.com/office/powerpoint/2012/main">
+  <p:cSld>
+    <p:spTree>
+      <p:nvGrpSpPr>
+        <p:cNvPr id="224" name="Shape 224"/>
+        <p:cNvGrpSpPr/>
+        <p:nvPr/>
+      </p:nvGrpSpPr>
+      <p:grpSpPr>
+        <a:xfrm>
+          <a:off x="0" y="0"/>
+          <a:ext cx="0" cy="0"/>
+          <a:chOff x="0" y="0"/>
+          <a:chExt cx="0" cy="0"/>
+        </a:xfrm>
+      </p:grpSpPr>
+      <p:sp>
+        <p:nvSpPr>
+          <p:cNvPr id="225" name="Google Shape;225;p40"/>
+          <p:cNvSpPr txBox="1"/>
+          <p:nvPr>
+            <p:ph type="title"/>
+          </p:nvPr>
+        </p:nvSpPr>
+        <p:spPr>
+          <a:xfrm>
+            <a:off x="311700" y="445025"/>
+            <a:ext cx="8520600" cy="572700"/>
+          </a:xfrm>
+          <a:prstGeom prst="rect">
+            <a:avLst/>
+          </a:prstGeom>
+        </p:spPr>
+        <p:txBody>
+          <a:bodyPr anchorCtr="0" anchor="t" bIns="91425" lIns="91425" spcFirstLastPara="1" rIns="91425" wrap="square" tIns="91425">
+            <a:noAutofit/>
+          </a:bodyPr>
+          <a:lstStyle/>
+          <a:p>
+            <a:pPr indent="0" lvl="0" marL="0" rtl="0" algn="l">
+              <a:spcBef>
+                <a:spcPts val="0"/>
+              </a:spcBef>
+              <a:spcAft>
+                <a:spcPts val="0"/>
+              </a:spcAft>
+              <a:buNone/>
+            </a:pPr>
+            <a:r>
+              <a:rPr lang="en"/>
+              <a:t>Half_Adder Layout</a:t>
+            </a:r>
+            <a:endParaRPr/>
+          </a:p>
+        </p:txBody>
+      </p:sp>
+      <p:pic>
+        <p:nvPicPr>
+          <p:cNvPr id="226" name="Google Shape;226;p40"/>
+          <p:cNvPicPr preferRelativeResize="0"/>
+          <p:nvPr/>
+        </p:nvPicPr>
+        <p:blipFill>
+          <a:blip r:embed="rId3">
+            <a:alphaModFix/>
+          </a:blip>
+          <a:stretch>
+            <a:fillRect/>
+          </a:stretch>
+        </p:blipFill>
+        <p:spPr>
+          <a:xfrm>
+            <a:off x="1320800" y="1144725"/>
+            <a:ext cx="5953125" cy="3552825"/>
+          </a:xfrm>
+          <a:prstGeom prst="rect">
+            <a:avLst/>
+          </a:prstGeom>
+          <a:noFill/>
+          <a:ln>
+            <a:noFill/>
+          </a:ln>
+        </p:spPr>
+      </p:pic>
+    </p:spTree>
+  </p:cSld>
+  <p:clrMapOvr>
+    <a:masterClrMapping/>
+  </p:clrMapOvr>
+</p:sld>
+</file>
+
+<file path=ppt/slides/slide29.xml><?xml version="1.0" encoding="utf-8"?>
+<p:sld xmlns:a="http://schemas.openxmlformats.org/drawingml/2006/main" xmlns:r="http://schemas.openxmlformats.org/officeDocument/2006/relationships" xmlns:mc="http://schemas.openxmlformats.org/markup-compatibility/2006" xmlns:mv="urn:schemas-microsoft-com:mac:vml" xmlns:p="http://schemas.openxmlformats.org/presentationml/2006/main" xmlns:c="http://schemas.openxmlformats.org/drawingml/2006/chart" xmlns:dgm="http://schemas.openxmlformats.org/drawingml/2006/diagram" xmlns:o="urn:schemas-microsoft-com:office:office" xmlns:v="urn:schemas-microsoft-com:vml" xmlns:pvml="urn:schemas-microsoft-com:office:powerpoint" xmlns:com="http://schemas.openxmlformats.org/drawingml/2006/compatibility" xmlns:p14="http://schemas.microsoft.com/office/powerpoint/2010/main" xmlns:p15="http://schemas.microsoft.com/office/powerpoint/2012/main">
+  <p:cSld>
+    <p:spTree>
+      <p:nvGrpSpPr>
+        <p:cNvPr id="230" name="Shape 230"/>
+        <p:cNvGrpSpPr/>
+        <p:nvPr/>
+      </p:nvGrpSpPr>
+      <p:grpSpPr>
+        <a:xfrm>
+          <a:off x="0" y="0"/>
+          <a:ext cx="0" cy="0"/>
+          <a:chOff x="0" y="0"/>
+          <a:chExt cx="0" cy="0"/>
+        </a:xfrm>
+      </p:grpSpPr>
+      <p:sp>
+        <p:nvSpPr>
+          <p:cNvPr id="231" name="Google Shape;231;p41"/>
+          <p:cNvSpPr txBox="1"/>
+          <p:nvPr>
+            <p:ph type="title"/>
+          </p:nvPr>
+        </p:nvSpPr>
+        <p:spPr>
+          <a:xfrm>
+            <a:off x="311700" y="445025"/>
+            <a:ext cx="8520600" cy="572700"/>
+          </a:xfrm>
+          <a:prstGeom prst="rect">
+            <a:avLst/>
+          </a:prstGeom>
+        </p:spPr>
+        <p:txBody>
+          <a:bodyPr anchorCtr="0" anchor="t" bIns="91425" lIns="91425" spcFirstLastPara="1" rIns="91425" wrap="square" tIns="91425">
+            <a:noAutofit/>
+          </a:bodyPr>
+          <a:lstStyle/>
+          <a:p>
+            <a:pPr indent="0" lvl="0" marL="0" rtl="0" algn="l">
+              <a:spcBef>
+                <a:spcPts val="0"/>
+              </a:spcBef>
+              <a:spcAft>
+                <a:spcPts val="0"/>
+              </a:spcAft>
+              <a:buNone/>
+            </a:pPr>
+            <a:r>
+              <a:rPr lang="en"/>
+              <a:t>Round_Robin_Arbiter Layout</a:t>
+            </a:r>
+            <a:endParaRPr/>
+          </a:p>
+        </p:txBody>
+      </p:sp>
+      <p:pic>
+        <p:nvPicPr>
+          <p:cNvPr id="232" name="Google Shape;232;p41"/>
+          <p:cNvPicPr preferRelativeResize="0"/>
+          <p:nvPr/>
+        </p:nvPicPr>
+        <p:blipFill>
+          <a:blip r:embed="rId3">
+            <a:alphaModFix/>
+          </a:blip>
+          <a:stretch>
+            <a:fillRect/>
+          </a:stretch>
+        </p:blipFill>
+        <p:spPr>
+          <a:xfrm>
+            <a:off x="1447800" y="1132025"/>
+            <a:ext cx="5953125" cy="3552825"/>
           </a:xfrm>
           <a:prstGeom prst="rect">
             <a:avLst/>
@@ -10677,7 +12983,7 @@
             </a:pPr>
             <a:r>
               <a:rPr lang="en"/>
-              <a:t>Macro Placemen</a:t>
+              <a:t>Macro Peplacement</a:t>
             </a:r>
             <a:endParaRPr/>
           </a:p>
@@ -10694,7 +13000,7 @@
             </a:pPr>
             <a:r>
               <a:rPr lang="en"/>
-              <a:t>Creating Power Rings and Strapst</a:t>
+              <a:t>Creating Power Rings and Straps</a:t>
             </a:r>
             <a:endParaRPr/>
           </a:p>
@@ -10898,6 +13204,285 @@
 </file>
 
 <file path=ppt/theme/theme1.xml><?xml version="1.0" encoding="utf-8"?>
+<a:theme xmlns:a="http://schemas.openxmlformats.org/drawingml/2006/main" xmlns:r="http://schemas.openxmlformats.org/officeDocument/2006/relationships" name="Simple Dark">
+  <a:themeElements>
+    <a:clrScheme name="Simple Dark">
+      <a:dk1>
+        <a:srgbClr val="FFFFFF"/>
+      </a:dk1>
+      <a:lt1>
+        <a:srgbClr val="212121"/>
+      </a:lt1>
+      <a:dk2>
+        <a:srgbClr val="303030"/>
+      </a:dk2>
+      <a:lt2>
+        <a:srgbClr val="ADADAD"/>
+      </a:lt2>
+      <a:accent1>
+        <a:srgbClr val="009688"/>
+      </a:accent1>
+      <a:accent2>
+        <a:srgbClr val="EEEEEE"/>
+      </a:accent2>
+      <a:accent3>
+        <a:srgbClr val="78909C"/>
+      </a:accent3>
+      <a:accent4>
+        <a:srgbClr val="FFAB40"/>
+      </a:accent4>
+      <a:accent5>
+        <a:srgbClr val="4DD0E1"/>
+      </a:accent5>
+      <a:accent6>
+        <a:srgbClr val="EEFF41"/>
+      </a:accent6>
+      <a:hlink>
+        <a:srgbClr val="4DD0E1"/>
+      </a:hlink>
+      <a:folHlink>
+        <a:srgbClr val="4DD0E1"/>
+      </a:folHlink>
+    </a:clrScheme>
+    <a:fontScheme name="Office">
+      <a:majorFont>
+        <a:latin typeface="Arial"/>
+        <a:ea typeface=""/>
+        <a:cs typeface=""/>
+        <a:font script="Jpan" typeface="ＭＳ Ｐゴシック"/>
+        <a:font script="Hang" typeface="맑은 고딕"/>
+        <a:font script="Hans" typeface="宋体"/>
+        <a:font script="Hant" typeface="新細明體"/>
+        <a:font script="Arab" typeface="Times New Roman"/>
+        <a:font script="Hebr" typeface="Times New Roman"/>
+        <a:font script="Thai" typeface="Angsana New"/>
+        <a:font script="Ethi" typeface="Nyala"/>
+        <a:font script="Beng" typeface="Vrinda"/>
+        <a:font script="Gujr" typeface="Shruti"/>
+        <a:font script="Khmr" typeface="MoolBoran"/>
+        <a:font script="Knda" typeface="Tunga"/>
+        <a:font script="Guru" typeface="Raavi"/>
+        <a:font script="Cans" typeface="Euphemia"/>
+        <a:font script="Cher" typeface="Plantagenet Cherokee"/>
+        <a:font script="Yiii" typeface="Microsoft Yi Baiti"/>
+        <a:font script="Tibt" typeface="Microsoft Himalaya"/>
+        <a:font script="Thaa" typeface="MV Boli"/>
+        <a:font script="Deva" typeface="Mangal"/>
+        <a:font script="Telu" typeface="Gautami"/>
+        <a:font script="Taml" typeface="Latha"/>
+        <a:font script="Syrc" typeface="Estrangelo Edessa"/>
+        <a:font script="Orya" typeface="Kalinga"/>
+        <a:font script="Mlym" typeface="Kartika"/>
+        <a:font script="Laoo" typeface="DokChampa"/>
+        <a:font script="Sinh" typeface="Iskoola Pota"/>
+        <a:font script="Mong" typeface="Mongolian Baiti"/>
+        <a:font script="Viet" typeface="Times New Roman"/>
+        <a:font script="Uigh" typeface="Microsoft Uighur"/>
+        <a:font script="Geor" typeface="Sylfaen"/>
+      </a:majorFont>
+      <a:minorFont>
+        <a:latin typeface="Arial"/>
+        <a:ea typeface=""/>
+        <a:cs typeface=""/>
+        <a:font script="Jpan" typeface="ＭＳ Ｐゴシック"/>
+        <a:font script="Hang" typeface="맑은 고딕"/>
+        <a:font script="Hans" typeface="宋体"/>
+        <a:font script="Hant" typeface="新細明體"/>
+        <a:font script="Arab" typeface="Arial"/>
+        <a:font script="Hebr" typeface="Arial"/>
+        <a:font script="Thai" typeface="Cordia New"/>
+        <a:font script="Ethi" typeface="Nyala"/>
+        <a:font script="Beng" typeface="Vrinda"/>
+        <a:font script="Gujr" typeface="Shruti"/>
+        <a:font script="Khmr" typeface="DaunPenh"/>
+        <a:font script="Knda" typeface="Tunga"/>
+        <a:font script="Guru" typeface="Raavi"/>
+        <a:font script="Cans" typeface="Euphemia"/>
+        <a:font script="Cher" typeface="Plantagenet Cherokee"/>
+        <a:font script="Yiii" typeface="Microsoft Yi Baiti"/>
+        <a:font script="Tibt" typeface="Microsoft Himalaya"/>
+        <a:font script="Thaa" typeface="MV Boli"/>
+        <a:font script="Deva" typeface="Mangal"/>
+        <a:font script="Telu" typeface="Gautami"/>
+        <a:font script="Taml" typeface="Latha"/>
+        <a:font script="Syrc" typeface="Estrangelo Edessa"/>
+        <a:font script="Orya" typeface="Kalinga"/>
+        <a:font script="Mlym" typeface="Kartika"/>
+        <a:font script="Laoo" typeface="DokChampa"/>
+        <a:font script="Sinh" typeface="Iskoola Pota"/>
+        <a:font script="Mong" typeface="Mongolian Baiti"/>
+        <a:font script="Viet" typeface="Arial"/>
+        <a:font script="Uigh" typeface="Microsoft Uighur"/>
+        <a:font script="Geor" typeface="Sylfaen"/>
+      </a:minorFont>
+    </a:fontScheme>
+    <a:fmtScheme name="Office">
+      <a:fillStyleLst>
+        <a:solidFill>
+          <a:schemeClr val="phClr"/>
+        </a:solidFill>
+        <a:gradFill rotWithShape="1">
+          <a:gsLst>
+            <a:gs pos="0">
+              <a:schemeClr val="phClr">
+                <a:tint val="50000"/>
+                <a:satMod val="300000"/>
+              </a:schemeClr>
+            </a:gs>
+            <a:gs pos="35000">
+              <a:schemeClr val="phClr">
+                <a:tint val="37000"/>
+                <a:satMod val="300000"/>
+              </a:schemeClr>
+            </a:gs>
+            <a:gs pos="100000">
+              <a:schemeClr val="phClr">
+                <a:tint val="15000"/>
+                <a:satMod val="350000"/>
+              </a:schemeClr>
+            </a:gs>
+          </a:gsLst>
+          <a:lin ang="16200000" scaled="1"/>
+        </a:gradFill>
+        <a:gradFill rotWithShape="1">
+          <a:gsLst>
+            <a:gs pos="0">
+              <a:schemeClr val="phClr">
+                <a:tint val="100000"/>
+                <a:shade val="100000"/>
+                <a:satMod val="130000"/>
+              </a:schemeClr>
+            </a:gs>
+            <a:gs pos="100000">
+              <a:schemeClr val="phClr">
+                <a:tint val="50000"/>
+                <a:shade val="100000"/>
+                <a:satMod val="350000"/>
+              </a:schemeClr>
+            </a:gs>
+          </a:gsLst>
+          <a:lin ang="16200000" scaled="0"/>
+        </a:gradFill>
+      </a:fillStyleLst>
+      <a:lnStyleLst>
+        <a:ln w="9525" cap="flat" cmpd="sng" algn="ctr">
+          <a:solidFill>
+            <a:schemeClr val="phClr">
+              <a:shade val="95000"/>
+              <a:satMod val="105000"/>
+            </a:schemeClr>
+          </a:solidFill>
+          <a:prstDash val="solid"/>
+        </a:ln>
+        <a:ln w="25400" cap="flat" cmpd="sng" algn="ctr">
+          <a:solidFill>
+            <a:schemeClr val="phClr"/>
+          </a:solidFill>
+          <a:prstDash val="solid"/>
+        </a:ln>
+        <a:ln w="38100" cap="flat" cmpd="sng" algn="ctr">
+          <a:solidFill>
+            <a:schemeClr val="phClr"/>
+          </a:solidFill>
+          <a:prstDash val="solid"/>
+        </a:ln>
+      </a:lnStyleLst>
+      <a:effectStyleLst>
+        <a:effectStyle>
+          <a:effectLst>
+            <a:outerShdw blurRad="40000" dist="20000" dir="5400000" rotWithShape="0">
+              <a:srgbClr val="000000">
+                <a:alpha val="38000"/>
+              </a:srgbClr>
+            </a:outerShdw>
+          </a:effectLst>
+        </a:effectStyle>
+        <a:effectStyle>
+          <a:effectLst>
+            <a:outerShdw blurRad="40000" dist="23000" dir="5400000" rotWithShape="0">
+              <a:srgbClr val="000000">
+                <a:alpha val="35000"/>
+              </a:srgbClr>
+            </a:outerShdw>
+          </a:effectLst>
+        </a:effectStyle>
+        <a:effectStyle>
+          <a:effectLst>
+            <a:outerShdw blurRad="40000" dist="23000" dir="5400000" rotWithShape="0">
+              <a:srgbClr val="000000">
+                <a:alpha val="35000"/>
+              </a:srgbClr>
+            </a:outerShdw>
+          </a:effectLst>
+          <a:scene3d>
+            <a:camera prst="orthographicFront">
+              <a:rot lat="0" lon="0" rev="0"/>
+            </a:camera>
+            <a:lightRig rig="threePt" dir="t">
+              <a:rot lat="0" lon="0" rev="1200000"/>
+            </a:lightRig>
+          </a:scene3d>
+          <a:sp3d>
+            <a:bevelT w="63500" h="25400"/>
+          </a:sp3d>
+        </a:effectStyle>
+      </a:effectStyleLst>
+      <a:bgFillStyleLst>
+        <a:solidFill>
+          <a:schemeClr val="phClr"/>
+        </a:solidFill>
+        <a:gradFill rotWithShape="1">
+          <a:gsLst>
+            <a:gs pos="0">
+              <a:schemeClr val="phClr">
+                <a:tint val="40000"/>
+                <a:satMod val="350000"/>
+              </a:schemeClr>
+            </a:gs>
+            <a:gs pos="40000">
+              <a:schemeClr val="phClr">
+                <a:tint val="45000"/>
+                <a:shade val="99000"/>
+                <a:satMod val="350000"/>
+              </a:schemeClr>
+            </a:gs>
+            <a:gs pos="100000">
+              <a:schemeClr val="phClr">
+                <a:shade val="20000"/>
+                <a:satMod val="255000"/>
+              </a:schemeClr>
+            </a:gs>
+          </a:gsLst>
+          <a:path path="circle">
+            <a:fillToRect l="50000" t="-80000" r="50000" b="180000"/>
+          </a:path>
+        </a:gradFill>
+        <a:gradFill rotWithShape="1">
+          <a:gsLst>
+            <a:gs pos="0">
+              <a:schemeClr val="phClr">
+                <a:tint val="80000"/>
+                <a:satMod val="300000"/>
+              </a:schemeClr>
+            </a:gs>
+            <a:gs pos="100000">
+              <a:schemeClr val="phClr">
+                <a:shade val="30000"/>
+                <a:satMod val="200000"/>
+              </a:schemeClr>
+            </a:gs>
+          </a:gsLst>
+          <a:path path="circle">
+            <a:fillToRect l="50000" t="50000" r="50000" b="50000"/>
+          </a:path>
+        </a:gradFill>
+      </a:bgFillStyleLst>
+    </a:fmtScheme>
+  </a:themeElements>
+</a:theme>
+</file>
+
+<file path=ppt/theme/theme2.xml><?xml version="1.0" encoding="utf-8"?>
 <a:theme xmlns:a="http://schemas.openxmlformats.org/drawingml/2006/main" xmlns:r="http://schemas.openxmlformats.org/officeDocument/2006/relationships">
   <a:themeElements>
     <a:clrScheme name="Default">
@@ -11174,283 +13759,4 @@
     </a:fmtScheme>
   </a:themeElements>
 </a:theme>
-</file>
-
-<file path=ppt/theme/theme2.xml><?xml version="1.0" encoding="utf-8"?>
-<a:theme xmlns:a="http://schemas.openxmlformats.org/drawingml/2006/main" xmlns:r="http://schemas.openxmlformats.org/officeDocument/2006/relationships" name="Simple Dark">
-  <a:themeElements>
-    <a:clrScheme name="Simple Dark">
-      <a:dk1>
-        <a:srgbClr val="FFFFFF"/>
-      </a:dk1>
-      <a:lt1>
-        <a:srgbClr val="212121"/>
-      </a:lt1>
-      <a:dk2>
-        <a:srgbClr val="303030"/>
-      </a:dk2>
-      <a:lt2>
-        <a:srgbClr val="ADADAD"/>
-      </a:lt2>
-      <a:accent1>
-        <a:srgbClr val="009688"/>
-      </a:accent1>
-      <a:accent2>
-        <a:srgbClr val="EEEEEE"/>
-      </a:accent2>
-      <a:accent3>
-        <a:srgbClr val="78909C"/>
-      </a:accent3>
-      <a:accent4>
-        <a:srgbClr val="FFAB40"/>
-      </a:accent4>
-      <a:accent5>
-        <a:srgbClr val="4DD0E1"/>
-      </a:accent5>
-      <a:accent6>
-        <a:srgbClr val="EEFF41"/>
-      </a:accent6>
-      <a:hlink>
-        <a:srgbClr val="4DD0E1"/>
-      </a:hlink>
-      <a:folHlink>
-        <a:srgbClr val="4DD0E1"/>
-      </a:folHlink>
-    </a:clrScheme>
-    <a:fontScheme name="Office">
-      <a:majorFont>
-        <a:latin typeface="Arial"/>
-        <a:ea typeface=""/>
-        <a:cs typeface=""/>
-        <a:font script="Jpan" typeface="ＭＳ Ｐゴシック"/>
-        <a:font script="Hang" typeface="맑은 고딕"/>
-        <a:font script="Hans" typeface="宋体"/>
-        <a:font script="Hant" typeface="新細明體"/>
-        <a:font script="Arab" typeface="Times New Roman"/>
-        <a:font script="Hebr" typeface="Times New Roman"/>
-        <a:font script="Thai" typeface="Angsana New"/>
-        <a:font script="Ethi" typeface="Nyala"/>
-        <a:font script="Beng" typeface="Vrinda"/>
-        <a:font script="Gujr" typeface="Shruti"/>
-        <a:font script="Khmr" typeface="MoolBoran"/>
-        <a:font script="Knda" typeface="Tunga"/>
-        <a:font script="Guru" typeface="Raavi"/>
-        <a:font script="Cans" typeface="Euphemia"/>
-        <a:font script="Cher" typeface="Plantagenet Cherokee"/>
-        <a:font script="Yiii" typeface="Microsoft Yi Baiti"/>
-        <a:font script="Tibt" typeface="Microsoft Himalaya"/>
-        <a:font script="Thaa" typeface="MV Boli"/>
-        <a:font script="Deva" typeface="Mangal"/>
-        <a:font script="Telu" typeface="Gautami"/>
-        <a:font script="Taml" typeface="Latha"/>
-        <a:font script="Syrc" typeface="Estrangelo Edessa"/>
-        <a:font script="Orya" typeface="Kalinga"/>
-        <a:font script="Mlym" typeface="Kartika"/>
-        <a:font script="Laoo" typeface="DokChampa"/>
-        <a:font script="Sinh" typeface="Iskoola Pota"/>
-        <a:font script="Mong" typeface="Mongolian Baiti"/>
-        <a:font script="Viet" typeface="Times New Roman"/>
-        <a:font script="Uigh" typeface="Microsoft Uighur"/>
-        <a:font script="Geor" typeface="Sylfaen"/>
-      </a:majorFont>
-      <a:minorFont>
-        <a:latin typeface="Arial"/>
-        <a:ea typeface=""/>
-        <a:cs typeface=""/>
-        <a:font script="Jpan" typeface="ＭＳ Ｐゴシック"/>
-        <a:font script="Hang" typeface="맑은 고딕"/>
-        <a:font script="Hans" typeface="宋体"/>
-        <a:font script="Hant" typeface="新細明體"/>
-        <a:font script="Arab" typeface="Arial"/>
-        <a:font script="Hebr" typeface="Arial"/>
-        <a:font script="Thai" typeface="Cordia New"/>
-        <a:font script="Ethi" typeface="Nyala"/>
-        <a:font script="Beng" typeface="Vrinda"/>
-        <a:font script="Gujr" typeface="Shruti"/>
-        <a:font script="Khmr" typeface="DaunPenh"/>
-        <a:font script="Knda" typeface="Tunga"/>
-        <a:font script="Guru" typeface="Raavi"/>
-        <a:font script="Cans" typeface="Euphemia"/>
-        <a:font script="Cher" typeface="Plantagenet Cherokee"/>
-        <a:font script="Yiii" typeface="Microsoft Yi Baiti"/>
-        <a:font script="Tibt" typeface="Microsoft Himalaya"/>
-        <a:font script="Thaa" typeface="MV Boli"/>
-        <a:font script="Deva" typeface="Mangal"/>
-        <a:font script="Telu" typeface="Gautami"/>
-        <a:font script="Taml" typeface="Latha"/>
-        <a:font script="Syrc" typeface="Estrangelo Edessa"/>
-        <a:font script="Orya" typeface="Kalinga"/>
-        <a:font script="Mlym" typeface="Kartika"/>
-        <a:font script="Laoo" typeface="DokChampa"/>
-        <a:font script="Sinh" typeface="Iskoola Pota"/>
-        <a:font script="Mong" typeface="Mongolian Baiti"/>
-        <a:font script="Viet" typeface="Arial"/>
-        <a:font script="Uigh" typeface="Microsoft Uighur"/>
-        <a:font script="Geor" typeface="Sylfaen"/>
-      </a:minorFont>
-    </a:fontScheme>
-    <a:fmtScheme name="Office">
-      <a:fillStyleLst>
-        <a:solidFill>
-          <a:schemeClr val="phClr"/>
-        </a:solidFill>
-        <a:gradFill rotWithShape="1">
-          <a:gsLst>
-            <a:gs pos="0">
-              <a:schemeClr val="phClr">
-                <a:tint val="50000"/>
-                <a:satMod val="300000"/>
-              </a:schemeClr>
-            </a:gs>
-            <a:gs pos="35000">
-              <a:schemeClr val="phClr">
-                <a:tint val="37000"/>
-                <a:satMod val="300000"/>
-              </a:schemeClr>
-            </a:gs>
-            <a:gs pos="100000">
-              <a:schemeClr val="phClr">
-                <a:tint val="15000"/>
-                <a:satMod val="350000"/>
-              </a:schemeClr>
-            </a:gs>
-          </a:gsLst>
-          <a:lin ang="16200000" scaled="1"/>
-        </a:gradFill>
-        <a:gradFill rotWithShape="1">
-          <a:gsLst>
-            <a:gs pos="0">
-              <a:schemeClr val="phClr">
-                <a:tint val="100000"/>
-                <a:shade val="100000"/>
-                <a:satMod val="130000"/>
-              </a:schemeClr>
-            </a:gs>
-            <a:gs pos="100000">
-              <a:schemeClr val="phClr">
-                <a:tint val="50000"/>
-                <a:shade val="100000"/>
-                <a:satMod val="350000"/>
-              </a:schemeClr>
-            </a:gs>
-          </a:gsLst>
-          <a:lin ang="16200000" scaled="0"/>
-        </a:gradFill>
-      </a:fillStyleLst>
-      <a:lnStyleLst>
-        <a:ln w="9525" cap="flat" cmpd="sng" algn="ctr">
-          <a:solidFill>
-            <a:schemeClr val="phClr">
-              <a:shade val="95000"/>
-              <a:satMod val="105000"/>
-            </a:schemeClr>
-          </a:solidFill>
-          <a:prstDash val="solid"/>
-        </a:ln>
-        <a:ln w="25400" cap="flat" cmpd="sng" algn="ctr">
-          <a:solidFill>
-            <a:schemeClr val="phClr"/>
-          </a:solidFill>
-          <a:prstDash val="solid"/>
-        </a:ln>
-        <a:ln w="38100" cap="flat" cmpd="sng" algn="ctr">
-          <a:solidFill>
-            <a:schemeClr val="phClr"/>
-          </a:solidFill>
-          <a:prstDash val="solid"/>
-        </a:ln>
-      </a:lnStyleLst>
-      <a:effectStyleLst>
-        <a:effectStyle>
-          <a:effectLst>
-            <a:outerShdw blurRad="40000" dist="20000" dir="5400000" rotWithShape="0">
-              <a:srgbClr val="000000">
-                <a:alpha val="38000"/>
-              </a:srgbClr>
-            </a:outerShdw>
-          </a:effectLst>
-        </a:effectStyle>
-        <a:effectStyle>
-          <a:effectLst>
-            <a:outerShdw blurRad="40000" dist="23000" dir="5400000" rotWithShape="0">
-              <a:srgbClr val="000000">
-                <a:alpha val="35000"/>
-              </a:srgbClr>
-            </a:outerShdw>
-          </a:effectLst>
-        </a:effectStyle>
-        <a:effectStyle>
-          <a:effectLst>
-            <a:outerShdw blurRad="40000" dist="23000" dir="5400000" rotWithShape="0">
-              <a:srgbClr val="000000">
-                <a:alpha val="35000"/>
-              </a:srgbClr>
-            </a:outerShdw>
-          </a:effectLst>
-          <a:scene3d>
-            <a:camera prst="orthographicFront">
-              <a:rot lat="0" lon="0" rev="0"/>
-            </a:camera>
-            <a:lightRig rig="threePt" dir="t">
-              <a:rot lat="0" lon="0" rev="1200000"/>
-            </a:lightRig>
-          </a:scene3d>
-          <a:sp3d>
-            <a:bevelT w="63500" h="25400"/>
-          </a:sp3d>
-        </a:effectStyle>
-      </a:effectStyleLst>
-      <a:bgFillStyleLst>
-        <a:solidFill>
-          <a:schemeClr val="phClr"/>
-        </a:solidFill>
-        <a:gradFill rotWithShape="1">
-          <a:gsLst>
-            <a:gs pos="0">
-              <a:schemeClr val="phClr">
-                <a:tint val="40000"/>
-                <a:satMod val="350000"/>
-              </a:schemeClr>
-            </a:gs>
-            <a:gs pos="40000">
-              <a:schemeClr val="phClr">
-                <a:tint val="45000"/>
-                <a:shade val="99000"/>
-                <a:satMod val="350000"/>
-              </a:schemeClr>
-            </a:gs>
-            <a:gs pos="100000">
-              <a:schemeClr val="phClr">
-                <a:shade val="20000"/>
-                <a:satMod val="255000"/>
-              </a:schemeClr>
-            </a:gs>
-          </a:gsLst>
-          <a:path path="circle">
-            <a:fillToRect l="50000" t="-80000" r="50000" b="180000"/>
-          </a:path>
-        </a:gradFill>
-        <a:gradFill rotWithShape="1">
-          <a:gsLst>
-            <a:gs pos="0">
-              <a:schemeClr val="phClr">
-                <a:tint val="80000"/>
-                <a:satMod val="300000"/>
-              </a:schemeClr>
-            </a:gs>
-            <a:gs pos="100000">
-              <a:schemeClr val="phClr">
-                <a:shade val="30000"/>
-                <a:satMod val="200000"/>
-              </a:schemeClr>
-            </a:gs>
-          </a:gsLst>
-          <a:path path="circle">
-            <a:fillToRect l="50000" t="50000" r="50000" b="50000"/>
-          </a:path>
-        </a:gradFill>
-      </a:bgFillStyleLst>
-    </a:fmtScheme>
-  </a:themeElements>
-</a:theme>
 </file>
</xml_diff>